<commit_message>
Update investor input. Todo: work on output.
</commit_message>
<xml_diff>
--- a/presentation/ML_Project_Proposal_Presentation.pptx
+++ b/presentation/ML_Project_Proposal_Presentation.pptx
@@ -2,7 +2,7 @@
 <file path=ppt/presentation.xml><?xml version="1.0" encoding="utf-8"?>
 <p:presentation xmlns:a="http://schemas.openxmlformats.org/drawingml/2006/main" xmlns:r="http://schemas.openxmlformats.org/officeDocument/2006/relationships" xmlns:p="http://schemas.openxmlformats.org/presentationml/2006/main" saveSubsetFonts="1" autoCompressPictures="0">
   <p:sldMasterIdLst>
-    <p:sldMasterId id="2147483648" r:id="rId1"/>
+    <p:sldMasterId id="2147483660" r:id="rId1"/>
   </p:sldMasterIdLst>
   <p:notesMasterIdLst>
     <p:notesMasterId r:id="rId12"/>
@@ -10,7 +10,7 @@
   <p:sldIdLst>
     <p:sldId id="256" r:id="rId2"/>
     <p:sldId id="257" r:id="rId3"/>
-    <p:sldId id="258" r:id="rId4"/>
+    <p:sldId id="267" r:id="rId4"/>
     <p:sldId id="259" r:id="rId5"/>
     <p:sldId id="260" r:id="rId6"/>
     <p:sldId id="261" r:id="rId7"/>
@@ -19,13 +19,13 @@
     <p:sldId id="264" r:id="rId10"/>
     <p:sldId id="265" r:id="rId11"/>
   </p:sldIdLst>
-  <p:sldSz cx="9144000" cy="6858000" type="screen4x3"/>
+  <p:sldSz cx="12192000" cy="6858000"/>
   <p:notesSz cx="6858000" cy="9144000"/>
   <p:defaultTextStyle>
     <a:defPPr>
       <a:defRPr lang="en-US"/>
     </a:defPPr>
-    <a:lvl1pPr marL="0" algn="l" defTabSz="457200" rtl="0" eaLnBrk="1" latinLnBrk="0" hangingPunct="1">
+    <a:lvl1pPr marL="0" algn="l" defTabSz="914400" rtl="0" eaLnBrk="1" latinLnBrk="0" hangingPunct="1">
       <a:defRPr sz="1800" kern="1200">
         <a:solidFill>
           <a:schemeClr val="tx1"/>
@@ -35,7 +35,7 @@
         <a:cs typeface="+mn-cs"/>
       </a:defRPr>
     </a:lvl1pPr>
-    <a:lvl2pPr marL="457200" algn="l" defTabSz="457200" rtl="0" eaLnBrk="1" latinLnBrk="0" hangingPunct="1">
+    <a:lvl2pPr marL="457200" algn="l" defTabSz="914400" rtl="0" eaLnBrk="1" latinLnBrk="0" hangingPunct="1">
       <a:defRPr sz="1800" kern="1200">
         <a:solidFill>
           <a:schemeClr val="tx1"/>
@@ -45,7 +45,7 @@
         <a:cs typeface="+mn-cs"/>
       </a:defRPr>
     </a:lvl2pPr>
-    <a:lvl3pPr marL="914400" algn="l" defTabSz="457200" rtl="0" eaLnBrk="1" latinLnBrk="0" hangingPunct="1">
+    <a:lvl3pPr marL="914400" algn="l" defTabSz="914400" rtl="0" eaLnBrk="1" latinLnBrk="0" hangingPunct="1">
       <a:defRPr sz="1800" kern="1200">
         <a:solidFill>
           <a:schemeClr val="tx1"/>
@@ -55,7 +55,7 @@
         <a:cs typeface="+mn-cs"/>
       </a:defRPr>
     </a:lvl3pPr>
-    <a:lvl4pPr marL="1371600" algn="l" defTabSz="457200" rtl="0" eaLnBrk="1" latinLnBrk="0" hangingPunct="1">
+    <a:lvl4pPr marL="1371600" algn="l" defTabSz="914400" rtl="0" eaLnBrk="1" latinLnBrk="0" hangingPunct="1">
       <a:defRPr sz="1800" kern="1200">
         <a:solidFill>
           <a:schemeClr val="tx1"/>
@@ -65,7 +65,7 @@
         <a:cs typeface="+mn-cs"/>
       </a:defRPr>
     </a:lvl4pPr>
-    <a:lvl5pPr marL="1828800" algn="l" defTabSz="457200" rtl="0" eaLnBrk="1" latinLnBrk="0" hangingPunct="1">
+    <a:lvl5pPr marL="1828800" algn="l" defTabSz="914400" rtl="0" eaLnBrk="1" latinLnBrk="0" hangingPunct="1">
       <a:defRPr sz="1800" kern="1200">
         <a:solidFill>
           <a:schemeClr val="tx1"/>
@@ -75,7 +75,7 @@
         <a:cs typeface="+mn-cs"/>
       </a:defRPr>
     </a:lvl5pPr>
-    <a:lvl6pPr marL="2286000" algn="l" defTabSz="457200" rtl="0" eaLnBrk="1" latinLnBrk="0" hangingPunct="1">
+    <a:lvl6pPr marL="2286000" algn="l" defTabSz="914400" rtl="0" eaLnBrk="1" latinLnBrk="0" hangingPunct="1">
       <a:defRPr sz="1800" kern="1200">
         <a:solidFill>
           <a:schemeClr val="tx1"/>
@@ -85,7 +85,7 @@
         <a:cs typeface="+mn-cs"/>
       </a:defRPr>
     </a:lvl6pPr>
-    <a:lvl7pPr marL="2743200" algn="l" defTabSz="457200" rtl="0" eaLnBrk="1" latinLnBrk="0" hangingPunct="1">
+    <a:lvl7pPr marL="2743200" algn="l" defTabSz="914400" rtl="0" eaLnBrk="1" latinLnBrk="0" hangingPunct="1">
       <a:defRPr sz="1800" kern="1200">
         <a:solidFill>
           <a:schemeClr val="tx1"/>
@@ -95,7 +95,7 @@
         <a:cs typeface="+mn-cs"/>
       </a:defRPr>
     </a:lvl7pPr>
-    <a:lvl8pPr marL="3200400" algn="l" defTabSz="457200" rtl="0" eaLnBrk="1" latinLnBrk="0" hangingPunct="1">
+    <a:lvl8pPr marL="3200400" algn="l" defTabSz="914400" rtl="0" eaLnBrk="1" latinLnBrk="0" hangingPunct="1">
       <a:defRPr sz="1800" kern="1200">
         <a:solidFill>
           <a:schemeClr val="tx1"/>
@@ -105,7 +105,7 @@
         <a:cs typeface="+mn-cs"/>
       </a:defRPr>
     </a:lvl8pPr>
-    <a:lvl9pPr marL="3657600" algn="l" defTabSz="457200" rtl="0" eaLnBrk="1" latinLnBrk="0" hangingPunct="1">
+    <a:lvl9pPr marL="3657600" algn="l" defTabSz="914400" rtl="0" eaLnBrk="1" latinLnBrk="0" hangingPunct="1">
       <a:defRPr sz="1800" kern="1200">
         <a:solidFill>
           <a:schemeClr val="tx1"/>
@@ -119,12 +119,12 @@
   <p:extLst>
     <p:ext uri="{EFAFB233-063F-42B5-8137-9DF3F51BA10A}">
       <p15:sldGuideLst xmlns:p15="http://schemas.microsoft.com/office/powerpoint/2012/main">
-        <p15:guide id="1" orient="horz" pos="2160">
+        <p15:guide id="1" orient="horz" pos="2160" userDrawn="1">
           <p15:clr>
             <a:srgbClr val="A4A3A4"/>
           </p15:clr>
         </p15:guide>
-        <p15:guide id="2" pos="2880">
+        <p15:guide id="2" pos="3840" userDrawn="1">
           <p15:clr>
             <a:srgbClr val="A4A3A4"/>
           </p15:clr>
@@ -264,8 +264,8 @@
         </p:nvSpPr>
         <p:spPr>
           <a:xfrm>
-            <a:off x="1371600" y="1143000"/>
-            <a:ext cx="4114800" cy="3086100"/>
+            <a:off x="685800" y="1143000"/>
+            <a:ext cx="5486400" cy="3086100"/>
           </a:xfrm>
           <a:prstGeom prst="rect">
             <a:avLst/>
@@ -540,7 +540,12 @@
             <p:ph type="sldImg"/>
           </p:nvPr>
         </p:nvSpPr>
-        <p:spPr/>
+        <p:spPr>
+          <a:xfrm>
+            <a:off x="685800" y="1143000"/>
+            <a:ext cx="5486400" cy="3086100"/>
+          </a:xfrm>
+        </p:spPr>
       </p:sp>
       <p:sp>
         <p:nvSpPr>
@@ -612,6 +617,143 @@
     <p:extLst>
       <p:ext uri="{BB962C8B-B14F-4D97-AF65-F5344CB8AC3E}">
         <p14:creationId xmlns:p14="http://schemas.microsoft.com/office/powerpoint/2010/main" val="356172875"/>
+      </p:ext>
+    </p:extLst>
+  </p:cSld>
+  <p:clrMapOvr>
+    <a:masterClrMapping/>
+  </p:clrMapOvr>
+</p:notes>
+</file>
+
+<file path=ppt/notesSlides/notesSlide2.xml><?xml version="1.0" encoding="utf-8"?>
+<p:notes xmlns:a="http://schemas.openxmlformats.org/drawingml/2006/main" xmlns:r="http://schemas.openxmlformats.org/officeDocument/2006/relationships" xmlns:p="http://schemas.openxmlformats.org/presentationml/2006/main">
+  <p:cSld>
+    <p:spTree>
+      <p:nvGrpSpPr>
+        <p:cNvPr id="1" name="">
+          <a:extLst>
+            <a:ext uri="{FF2B5EF4-FFF2-40B4-BE49-F238E27FC236}">
+              <a16:creationId xmlns:a16="http://schemas.microsoft.com/office/drawing/2014/main" id="{72FD1E42-437F-39F8-F952-D5DFB13C6E81}"/>
+            </a:ext>
+          </a:extLst>
+        </p:cNvPr>
+        <p:cNvGrpSpPr/>
+        <p:nvPr/>
+      </p:nvGrpSpPr>
+      <p:grpSpPr>
+        <a:xfrm>
+          <a:off x="0" y="0"/>
+          <a:ext cx="0" cy="0"/>
+          <a:chOff x="0" y="0"/>
+          <a:chExt cx="0" cy="0"/>
+        </a:xfrm>
+      </p:grpSpPr>
+      <p:sp>
+        <p:nvSpPr>
+          <p:cNvPr id="2" name="Slide Image Placeholder 1">
+            <a:extLst>
+              <a:ext uri="{FF2B5EF4-FFF2-40B4-BE49-F238E27FC236}">
+                <a16:creationId xmlns:a16="http://schemas.microsoft.com/office/drawing/2014/main" id="{6C6E19B0-E538-816A-D1A6-C4FC60C20D50}"/>
+              </a:ext>
+            </a:extLst>
+          </p:cNvPr>
+          <p:cNvSpPr>
+            <a:spLocks noGrp="1" noRot="1" noChangeAspect="1"/>
+          </p:cNvSpPr>
+          <p:nvPr>
+            <p:ph type="sldImg"/>
+          </p:nvPr>
+        </p:nvSpPr>
+        <p:spPr>
+          <a:xfrm>
+            <a:off x="685800" y="1143000"/>
+            <a:ext cx="5486400" cy="3086100"/>
+          </a:xfrm>
+        </p:spPr>
+      </p:sp>
+      <p:sp>
+        <p:nvSpPr>
+          <p:cNvPr id="3" name="Notes Placeholder 2">
+            <a:extLst>
+              <a:ext uri="{FF2B5EF4-FFF2-40B4-BE49-F238E27FC236}">
+                <a16:creationId xmlns:a16="http://schemas.microsoft.com/office/drawing/2014/main" id="{0F2B84A7-61AE-88DD-9082-33E278FDD72E}"/>
+              </a:ext>
+            </a:extLst>
+          </p:cNvPr>
+          <p:cNvSpPr>
+            <a:spLocks noGrp="1"/>
+          </p:cNvSpPr>
+          <p:nvPr>
+            <p:ph type="body" idx="1"/>
+          </p:nvPr>
+        </p:nvSpPr>
+        <p:spPr/>
+        <p:txBody>
+          <a:bodyPr/>
+          <a:lstStyle/>
+          <a:p>
+            <a:r>
+              <a:rPr lang="en-US" dirty="0"/>
+              <a:t>Description of the input form (e.g., user risk preferences, investment amount).</a:t>
+            </a:r>
+          </a:p>
+          <a:p>
+            <a:r>
+              <a:rPr lang="en-US" dirty="0"/>
+              <a:t>Output visualization: Performance graphs, risk metrics (e.g., Sharpe Ratio).</a:t>
+            </a:r>
+          </a:p>
+          <a:p>
+            <a:r>
+              <a:rPr lang="en-US" dirty="0"/>
+              <a:t>Importance of intuitive design for user interaction.</a:t>
+            </a:r>
+          </a:p>
+          <a:p>
+            <a:r>
+              <a:rPr lang="en-US" dirty="0"/>
+              <a:t>Time allocation: 30 seconds.</a:t>
+            </a:r>
+          </a:p>
+          <a:p>
+            <a:endParaRPr lang="en-US" dirty="0"/>
+          </a:p>
+        </p:txBody>
+      </p:sp>
+      <p:sp>
+        <p:nvSpPr>
+          <p:cNvPr id="4" name="Slide Number Placeholder 3">
+            <a:extLst>
+              <a:ext uri="{FF2B5EF4-FFF2-40B4-BE49-F238E27FC236}">
+                <a16:creationId xmlns:a16="http://schemas.microsoft.com/office/drawing/2014/main" id="{ED807D33-D14B-C728-27E0-677A43FC1708}"/>
+              </a:ext>
+            </a:extLst>
+          </p:cNvPr>
+          <p:cNvSpPr>
+            <a:spLocks noGrp="1"/>
+          </p:cNvSpPr>
+          <p:nvPr>
+            <p:ph type="sldNum" sz="quarter" idx="5"/>
+          </p:nvPr>
+        </p:nvSpPr>
+        <p:spPr/>
+        <p:txBody>
+          <a:bodyPr/>
+          <a:lstStyle/>
+          <a:p>
+            <a:fld id="{147366D2-7124-4B92-AA30-5C70CE066253}" type="slidenum">
+              <a:rPr lang="en-US" smtClean="0"/>
+              <a:t>3</a:t>
+            </a:fld>
+            <a:endParaRPr lang="en-US"/>
+          </a:p>
+        </p:txBody>
+      </p:sp>
+    </p:spTree>
+    <p:extLst>
+      <p:ext uri="{BB962C8B-B14F-4D97-AF65-F5344CB8AC3E}">
+        <p14:creationId xmlns:p14="http://schemas.microsoft.com/office/powerpoint/2010/main" val="2876653302"/>
       </p:ext>
     </p:extLst>
   </p:cSld>
@@ -640,7 +782,13 @@
       </p:grpSpPr>
       <p:sp>
         <p:nvSpPr>
-          <p:cNvPr id="2" name="Title 1"/>
+          <p:cNvPr id="2" name="Title 1">
+            <a:extLst>
+              <a:ext uri="{FF2B5EF4-FFF2-40B4-BE49-F238E27FC236}">
+                <a16:creationId xmlns:a16="http://schemas.microsoft.com/office/drawing/2014/main" id="{2A986E64-13AF-2AD6-3B98-BD7DEC3E7C04}"/>
+              </a:ext>
+            </a:extLst>
+          </p:cNvPr>
           <p:cNvSpPr>
             <a:spLocks noGrp="1"/>
           </p:cNvSpPr>
@@ -650,13 +798,17 @@
         </p:nvSpPr>
         <p:spPr>
           <a:xfrm>
-            <a:off x="685800" y="2130425"/>
-            <a:ext cx="7772400" cy="1470025"/>
+            <a:off x="1524000" y="1122363"/>
+            <a:ext cx="9144000" cy="2387600"/>
           </a:xfrm>
         </p:spPr>
         <p:txBody>
-          <a:bodyPr/>
-          <a:lstStyle/>
+          <a:bodyPr anchor="b"/>
+          <a:lstStyle>
+            <a:lvl1pPr algn="ctr">
+              <a:defRPr sz="6000"/>
+            </a:lvl1pPr>
+          </a:lstStyle>
           <a:p>
             <a:r>
               <a:rPr lang="en-US"/>
@@ -667,7 +819,13 @@
       </p:sp>
       <p:sp>
         <p:nvSpPr>
-          <p:cNvPr id="3" name="Subtitle 2"/>
+          <p:cNvPr id="3" name="Subtitle 2">
+            <a:extLst>
+              <a:ext uri="{FF2B5EF4-FFF2-40B4-BE49-F238E27FC236}">
+                <a16:creationId xmlns:a16="http://schemas.microsoft.com/office/drawing/2014/main" id="{FB4C56EC-6ACF-762C-7386-77C60CDEF821}"/>
+              </a:ext>
+            </a:extLst>
+          </p:cNvPr>
           <p:cNvSpPr>
             <a:spLocks noGrp="1"/>
           </p:cNvSpPr>
@@ -677,8 +835,8 @@
         </p:nvSpPr>
         <p:spPr>
           <a:xfrm>
-            <a:off x="1371600" y="3886200"/>
-            <a:ext cx="6400800" cy="1752600"/>
+            <a:off x="1524000" y="3602038"/>
+            <a:ext cx="9144000" cy="1655762"/>
           </a:xfrm>
         </p:spPr>
         <p:txBody>
@@ -686,93 +844,39 @@
           <a:lstStyle>
             <a:lvl1pPr marL="0" indent="0" algn="ctr">
               <a:buNone/>
-              <a:defRPr>
-                <a:solidFill>
-                  <a:schemeClr val="tx1">
-                    <a:tint val="75000"/>
-                  </a:schemeClr>
-                </a:solidFill>
-              </a:defRPr>
+              <a:defRPr sz="2400"/>
             </a:lvl1pPr>
             <a:lvl2pPr marL="457200" indent="0" algn="ctr">
               <a:buNone/>
-              <a:defRPr>
-                <a:solidFill>
-                  <a:schemeClr val="tx1">
-                    <a:tint val="75000"/>
-                  </a:schemeClr>
-                </a:solidFill>
-              </a:defRPr>
+              <a:defRPr sz="2000"/>
             </a:lvl2pPr>
             <a:lvl3pPr marL="914400" indent="0" algn="ctr">
               <a:buNone/>
-              <a:defRPr>
-                <a:solidFill>
-                  <a:schemeClr val="tx1">
-                    <a:tint val="75000"/>
-                  </a:schemeClr>
-                </a:solidFill>
-              </a:defRPr>
+              <a:defRPr sz="1800"/>
             </a:lvl3pPr>
             <a:lvl4pPr marL="1371600" indent="0" algn="ctr">
               <a:buNone/>
-              <a:defRPr>
-                <a:solidFill>
-                  <a:schemeClr val="tx1">
-                    <a:tint val="75000"/>
-                  </a:schemeClr>
-                </a:solidFill>
-              </a:defRPr>
+              <a:defRPr sz="1600"/>
             </a:lvl4pPr>
             <a:lvl5pPr marL="1828800" indent="0" algn="ctr">
               <a:buNone/>
-              <a:defRPr>
-                <a:solidFill>
-                  <a:schemeClr val="tx1">
-                    <a:tint val="75000"/>
-                  </a:schemeClr>
-                </a:solidFill>
-              </a:defRPr>
+              <a:defRPr sz="1600"/>
             </a:lvl5pPr>
             <a:lvl6pPr marL="2286000" indent="0" algn="ctr">
               <a:buNone/>
-              <a:defRPr>
-                <a:solidFill>
-                  <a:schemeClr val="tx1">
-                    <a:tint val="75000"/>
-                  </a:schemeClr>
-                </a:solidFill>
-              </a:defRPr>
+              <a:defRPr sz="1600"/>
             </a:lvl6pPr>
             <a:lvl7pPr marL="2743200" indent="0" algn="ctr">
               <a:buNone/>
-              <a:defRPr>
-                <a:solidFill>
-                  <a:schemeClr val="tx1">
-                    <a:tint val="75000"/>
-                  </a:schemeClr>
-                </a:solidFill>
-              </a:defRPr>
+              <a:defRPr sz="1600"/>
             </a:lvl7pPr>
             <a:lvl8pPr marL="3200400" indent="0" algn="ctr">
               <a:buNone/>
-              <a:defRPr>
-                <a:solidFill>
-                  <a:schemeClr val="tx1">
-                    <a:tint val="75000"/>
-                  </a:schemeClr>
-                </a:solidFill>
-              </a:defRPr>
+              <a:defRPr sz="1600"/>
             </a:lvl8pPr>
             <a:lvl9pPr marL="3657600" indent="0" algn="ctr">
               <a:buNone/>
-              <a:defRPr>
-                <a:solidFill>
-                  <a:schemeClr val="tx1">
-                    <a:tint val="75000"/>
-                  </a:schemeClr>
-                </a:solidFill>
-              </a:defRPr>
+              <a:defRPr sz="1600"/>
             </a:lvl9pPr>
           </a:lstStyle>
           <a:p>
@@ -785,7 +889,13 @@
       </p:sp>
       <p:sp>
         <p:nvSpPr>
-          <p:cNvPr id="4" name="Date Placeholder 3"/>
+          <p:cNvPr id="4" name="Date Placeholder 3">
+            <a:extLst>
+              <a:ext uri="{FF2B5EF4-FFF2-40B4-BE49-F238E27FC236}">
+                <a16:creationId xmlns:a16="http://schemas.microsoft.com/office/drawing/2014/main" id="{0BF3B083-8C10-518B-7FF4-55DD7723C9D3}"/>
+              </a:ext>
+            </a:extLst>
+          </p:cNvPr>
           <p:cNvSpPr>
             <a:spLocks noGrp="1"/>
           </p:cNvSpPr>
@@ -808,7 +918,13 @@
       </p:sp>
       <p:sp>
         <p:nvSpPr>
-          <p:cNvPr id="5" name="Footer Placeholder 4"/>
+          <p:cNvPr id="5" name="Footer Placeholder 4">
+            <a:extLst>
+              <a:ext uri="{FF2B5EF4-FFF2-40B4-BE49-F238E27FC236}">
+                <a16:creationId xmlns:a16="http://schemas.microsoft.com/office/drawing/2014/main" id="{CFE36530-6A2C-A9AF-73E2-8F428B2C043D}"/>
+              </a:ext>
+            </a:extLst>
+          </p:cNvPr>
           <p:cNvSpPr>
             <a:spLocks noGrp="1"/>
           </p:cNvSpPr>
@@ -827,7 +943,13 @@
       </p:sp>
       <p:sp>
         <p:nvSpPr>
-          <p:cNvPr id="6" name="Slide Number Placeholder 5"/>
+          <p:cNvPr id="6" name="Slide Number Placeholder 5">
+            <a:extLst>
+              <a:ext uri="{FF2B5EF4-FFF2-40B4-BE49-F238E27FC236}">
+                <a16:creationId xmlns:a16="http://schemas.microsoft.com/office/drawing/2014/main" id="{0EF4BC89-FCAF-151B-D171-90D8D16FB6D9}"/>
+              </a:ext>
+            </a:extLst>
+          </p:cNvPr>
           <p:cNvSpPr>
             <a:spLocks noGrp="1"/>
           </p:cNvSpPr>
@@ -851,7 +973,7 @@
     </p:spTree>
     <p:extLst>
       <p:ext uri="{BB962C8B-B14F-4D97-AF65-F5344CB8AC3E}">
-        <p14:creationId xmlns:p14="http://schemas.microsoft.com/office/powerpoint/2010/main" val="3168075583"/>
+        <p14:creationId xmlns:p14="http://schemas.microsoft.com/office/powerpoint/2010/main" val="4183489744"/>
       </p:ext>
     </p:extLst>
   </p:cSld>
@@ -880,7 +1002,13 @@
       </p:grpSpPr>
       <p:sp>
         <p:nvSpPr>
-          <p:cNvPr id="2" name="Title 1"/>
+          <p:cNvPr id="2" name="Title 1">
+            <a:extLst>
+              <a:ext uri="{FF2B5EF4-FFF2-40B4-BE49-F238E27FC236}">
+                <a16:creationId xmlns:a16="http://schemas.microsoft.com/office/drawing/2014/main" id="{D3F1B941-E4E3-84A8-159F-A98E34B4DBC7}"/>
+              </a:ext>
+            </a:extLst>
+          </p:cNvPr>
           <p:cNvSpPr>
             <a:spLocks noGrp="1"/>
           </p:cNvSpPr>
@@ -902,7 +1030,13 @@
       </p:sp>
       <p:sp>
         <p:nvSpPr>
-          <p:cNvPr id="3" name="Vertical Text Placeholder 2"/>
+          <p:cNvPr id="3" name="Vertical Text Placeholder 2">
+            <a:extLst>
+              <a:ext uri="{FF2B5EF4-FFF2-40B4-BE49-F238E27FC236}">
+                <a16:creationId xmlns:a16="http://schemas.microsoft.com/office/drawing/2014/main" id="{9DFA1E5E-CFC4-7521-AE9C-D341C0D17F84}"/>
+              </a:ext>
+            </a:extLst>
+          </p:cNvPr>
           <p:cNvSpPr>
             <a:spLocks noGrp="1"/>
           </p:cNvSpPr>
@@ -953,7 +1087,13 @@
       </p:sp>
       <p:sp>
         <p:nvSpPr>
-          <p:cNvPr id="4" name="Date Placeholder 3"/>
+          <p:cNvPr id="4" name="Date Placeholder 3">
+            <a:extLst>
+              <a:ext uri="{FF2B5EF4-FFF2-40B4-BE49-F238E27FC236}">
+                <a16:creationId xmlns:a16="http://schemas.microsoft.com/office/drawing/2014/main" id="{9B249C8D-CBAA-454C-97C8-A0D1F4BD06CE}"/>
+              </a:ext>
+            </a:extLst>
+          </p:cNvPr>
           <p:cNvSpPr>
             <a:spLocks noGrp="1"/>
           </p:cNvSpPr>
@@ -976,7 +1116,13 @@
       </p:sp>
       <p:sp>
         <p:nvSpPr>
-          <p:cNvPr id="5" name="Footer Placeholder 4"/>
+          <p:cNvPr id="5" name="Footer Placeholder 4">
+            <a:extLst>
+              <a:ext uri="{FF2B5EF4-FFF2-40B4-BE49-F238E27FC236}">
+                <a16:creationId xmlns:a16="http://schemas.microsoft.com/office/drawing/2014/main" id="{B3A3B561-EB35-6124-F878-B6C973BB8E02}"/>
+              </a:ext>
+            </a:extLst>
+          </p:cNvPr>
           <p:cNvSpPr>
             <a:spLocks noGrp="1"/>
           </p:cNvSpPr>
@@ -995,7 +1141,13 @@
       </p:sp>
       <p:sp>
         <p:nvSpPr>
-          <p:cNvPr id="6" name="Slide Number Placeholder 5"/>
+          <p:cNvPr id="6" name="Slide Number Placeholder 5">
+            <a:extLst>
+              <a:ext uri="{FF2B5EF4-FFF2-40B4-BE49-F238E27FC236}">
+                <a16:creationId xmlns:a16="http://schemas.microsoft.com/office/drawing/2014/main" id="{EAF19304-0E30-32BB-C893-498A5AFA6F34}"/>
+              </a:ext>
+            </a:extLst>
+          </p:cNvPr>
           <p:cNvSpPr>
             <a:spLocks noGrp="1"/>
           </p:cNvSpPr>
@@ -1019,7 +1171,7 @@
     </p:spTree>
     <p:extLst>
       <p:ext uri="{BB962C8B-B14F-4D97-AF65-F5344CB8AC3E}">
-        <p14:creationId xmlns:p14="http://schemas.microsoft.com/office/powerpoint/2010/main" val="2910927964"/>
+        <p14:creationId xmlns:p14="http://schemas.microsoft.com/office/powerpoint/2010/main" val="1151747983"/>
       </p:ext>
     </p:extLst>
   </p:cSld>
@@ -1048,7 +1200,13 @@
       </p:grpSpPr>
       <p:sp>
         <p:nvSpPr>
-          <p:cNvPr id="2" name="Vertical Title 1"/>
+          <p:cNvPr id="2" name="Vertical Title 1">
+            <a:extLst>
+              <a:ext uri="{FF2B5EF4-FFF2-40B4-BE49-F238E27FC236}">
+                <a16:creationId xmlns:a16="http://schemas.microsoft.com/office/drawing/2014/main" id="{0A08AB4A-BBFB-7E90-D00A-420BB10D7B19}"/>
+              </a:ext>
+            </a:extLst>
+          </p:cNvPr>
           <p:cNvSpPr>
             <a:spLocks noGrp="1"/>
           </p:cNvSpPr>
@@ -1058,8 +1216,8 @@
         </p:nvSpPr>
         <p:spPr>
           <a:xfrm>
-            <a:off x="6629400" y="274638"/>
-            <a:ext cx="2057400" cy="5851525"/>
+            <a:off x="8724900" y="365125"/>
+            <a:ext cx="2628900" cy="5811838"/>
           </a:xfrm>
         </p:spPr>
         <p:txBody>
@@ -1075,7 +1233,13 @@
       </p:sp>
       <p:sp>
         <p:nvSpPr>
-          <p:cNvPr id="3" name="Vertical Text Placeholder 2"/>
+          <p:cNvPr id="3" name="Vertical Text Placeholder 2">
+            <a:extLst>
+              <a:ext uri="{FF2B5EF4-FFF2-40B4-BE49-F238E27FC236}">
+                <a16:creationId xmlns:a16="http://schemas.microsoft.com/office/drawing/2014/main" id="{49DDCD6C-623B-0378-47A0-42C03670D320}"/>
+              </a:ext>
+            </a:extLst>
+          </p:cNvPr>
           <p:cNvSpPr>
             <a:spLocks noGrp="1"/>
           </p:cNvSpPr>
@@ -1085,8 +1249,8 @@
         </p:nvSpPr>
         <p:spPr>
           <a:xfrm>
-            <a:off x="457200" y="274638"/>
-            <a:ext cx="6019800" cy="5851525"/>
+            <a:off x="838200" y="365125"/>
+            <a:ext cx="7734300" cy="5811838"/>
           </a:xfrm>
         </p:spPr>
         <p:txBody>
@@ -1131,7 +1295,13 @@
       </p:sp>
       <p:sp>
         <p:nvSpPr>
-          <p:cNvPr id="4" name="Date Placeholder 3"/>
+          <p:cNvPr id="4" name="Date Placeholder 3">
+            <a:extLst>
+              <a:ext uri="{FF2B5EF4-FFF2-40B4-BE49-F238E27FC236}">
+                <a16:creationId xmlns:a16="http://schemas.microsoft.com/office/drawing/2014/main" id="{332DCFF9-81BD-A76B-AC5E-6585D11A335E}"/>
+              </a:ext>
+            </a:extLst>
+          </p:cNvPr>
           <p:cNvSpPr>
             <a:spLocks noGrp="1"/>
           </p:cNvSpPr>
@@ -1154,7 +1324,13 @@
       </p:sp>
       <p:sp>
         <p:nvSpPr>
-          <p:cNvPr id="5" name="Footer Placeholder 4"/>
+          <p:cNvPr id="5" name="Footer Placeholder 4">
+            <a:extLst>
+              <a:ext uri="{FF2B5EF4-FFF2-40B4-BE49-F238E27FC236}">
+                <a16:creationId xmlns:a16="http://schemas.microsoft.com/office/drawing/2014/main" id="{799641AD-2098-36AB-E6F1-E54E593FD604}"/>
+              </a:ext>
+            </a:extLst>
+          </p:cNvPr>
           <p:cNvSpPr>
             <a:spLocks noGrp="1"/>
           </p:cNvSpPr>
@@ -1173,7 +1349,13 @@
       </p:sp>
       <p:sp>
         <p:nvSpPr>
-          <p:cNvPr id="6" name="Slide Number Placeholder 5"/>
+          <p:cNvPr id="6" name="Slide Number Placeholder 5">
+            <a:extLst>
+              <a:ext uri="{FF2B5EF4-FFF2-40B4-BE49-F238E27FC236}">
+                <a16:creationId xmlns:a16="http://schemas.microsoft.com/office/drawing/2014/main" id="{D8788CE3-2773-3C1D-D617-CD2924CE2738}"/>
+              </a:ext>
+            </a:extLst>
+          </p:cNvPr>
           <p:cNvSpPr>
             <a:spLocks noGrp="1"/>
           </p:cNvSpPr>
@@ -1197,7 +1379,7 @@
     </p:spTree>
     <p:extLst>
       <p:ext uri="{BB962C8B-B14F-4D97-AF65-F5344CB8AC3E}">
-        <p14:creationId xmlns:p14="http://schemas.microsoft.com/office/powerpoint/2010/main" val="3612223792"/>
+        <p14:creationId xmlns:p14="http://schemas.microsoft.com/office/powerpoint/2010/main" val="950982101"/>
       </p:ext>
     </p:extLst>
   </p:cSld>
@@ -1226,7 +1408,13 @@
       </p:grpSpPr>
       <p:sp>
         <p:nvSpPr>
-          <p:cNvPr id="2" name="Title 1"/>
+          <p:cNvPr id="2" name="Title 1">
+            <a:extLst>
+              <a:ext uri="{FF2B5EF4-FFF2-40B4-BE49-F238E27FC236}">
+                <a16:creationId xmlns:a16="http://schemas.microsoft.com/office/drawing/2014/main" id="{69E7BF05-7D26-930D-BCCD-77F9FBAA4FFD}"/>
+              </a:ext>
+            </a:extLst>
+          </p:cNvPr>
           <p:cNvSpPr>
             <a:spLocks noGrp="1"/>
           </p:cNvSpPr>
@@ -1248,7 +1436,13 @@
       </p:sp>
       <p:sp>
         <p:nvSpPr>
-          <p:cNvPr id="3" name="Content Placeholder 2"/>
+          <p:cNvPr id="3" name="Content Placeholder 2">
+            <a:extLst>
+              <a:ext uri="{FF2B5EF4-FFF2-40B4-BE49-F238E27FC236}">
+                <a16:creationId xmlns:a16="http://schemas.microsoft.com/office/drawing/2014/main" id="{3A51B8BC-755F-D9D5-1777-51CA7FD80762}"/>
+              </a:ext>
+            </a:extLst>
+          </p:cNvPr>
           <p:cNvSpPr>
             <a:spLocks noGrp="1"/>
           </p:cNvSpPr>
@@ -1299,7 +1493,13 @@
       </p:sp>
       <p:sp>
         <p:nvSpPr>
-          <p:cNvPr id="4" name="Date Placeholder 3"/>
+          <p:cNvPr id="4" name="Date Placeholder 3">
+            <a:extLst>
+              <a:ext uri="{FF2B5EF4-FFF2-40B4-BE49-F238E27FC236}">
+                <a16:creationId xmlns:a16="http://schemas.microsoft.com/office/drawing/2014/main" id="{8336ADC5-F281-63BA-6300-3E32B1B474CA}"/>
+              </a:ext>
+            </a:extLst>
+          </p:cNvPr>
           <p:cNvSpPr>
             <a:spLocks noGrp="1"/>
           </p:cNvSpPr>
@@ -1322,7 +1522,13 @@
       </p:sp>
       <p:sp>
         <p:nvSpPr>
-          <p:cNvPr id="5" name="Footer Placeholder 4"/>
+          <p:cNvPr id="5" name="Footer Placeholder 4">
+            <a:extLst>
+              <a:ext uri="{FF2B5EF4-FFF2-40B4-BE49-F238E27FC236}">
+                <a16:creationId xmlns:a16="http://schemas.microsoft.com/office/drawing/2014/main" id="{647CF4AF-7C65-89F1-C8BB-AA805A464409}"/>
+              </a:ext>
+            </a:extLst>
+          </p:cNvPr>
           <p:cNvSpPr>
             <a:spLocks noGrp="1"/>
           </p:cNvSpPr>
@@ -1341,7 +1547,13 @@
       </p:sp>
       <p:sp>
         <p:nvSpPr>
-          <p:cNvPr id="6" name="Slide Number Placeholder 5"/>
+          <p:cNvPr id="6" name="Slide Number Placeholder 5">
+            <a:extLst>
+              <a:ext uri="{FF2B5EF4-FFF2-40B4-BE49-F238E27FC236}">
+                <a16:creationId xmlns:a16="http://schemas.microsoft.com/office/drawing/2014/main" id="{FFC308D6-F922-5F48-9A71-60D61B97E1AB}"/>
+              </a:ext>
+            </a:extLst>
+          </p:cNvPr>
           <p:cNvSpPr>
             <a:spLocks noGrp="1"/>
           </p:cNvSpPr>
@@ -1365,7 +1577,7 @@
     </p:spTree>
     <p:extLst>
       <p:ext uri="{BB962C8B-B14F-4D97-AF65-F5344CB8AC3E}">
-        <p14:creationId xmlns:p14="http://schemas.microsoft.com/office/powerpoint/2010/main" val="2614314258"/>
+        <p14:creationId xmlns:p14="http://schemas.microsoft.com/office/powerpoint/2010/main" val="1427195157"/>
       </p:ext>
     </p:extLst>
   </p:cSld>
@@ -1394,7 +1606,13 @@
       </p:grpSpPr>
       <p:sp>
         <p:nvSpPr>
-          <p:cNvPr id="2" name="Title 1"/>
+          <p:cNvPr id="2" name="Title 1">
+            <a:extLst>
+              <a:ext uri="{FF2B5EF4-FFF2-40B4-BE49-F238E27FC236}">
+                <a16:creationId xmlns:a16="http://schemas.microsoft.com/office/drawing/2014/main" id="{03F1F87C-6BCF-2C56-D1AB-59382A5FF16B}"/>
+              </a:ext>
+            </a:extLst>
+          </p:cNvPr>
           <p:cNvSpPr>
             <a:spLocks noGrp="1"/>
           </p:cNvSpPr>
@@ -1404,15 +1622,15 @@
         </p:nvSpPr>
         <p:spPr>
           <a:xfrm>
-            <a:off x="722313" y="4406900"/>
-            <a:ext cx="7772400" cy="1362075"/>
+            <a:off x="831850" y="1709738"/>
+            <a:ext cx="10515600" cy="2852737"/>
           </a:xfrm>
         </p:spPr>
         <p:txBody>
-          <a:bodyPr anchor="t"/>
+          <a:bodyPr anchor="b"/>
           <a:lstStyle>
-            <a:lvl1pPr algn="l">
-              <a:defRPr sz="4000" b="1" cap="all"/>
+            <a:lvl1pPr>
+              <a:defRPr sz="6000"/>
             </a:lvl1pPr>
           </a:lstStyle>
           <a:p>
@@ -1425,7 +1643,13 @@
       </p:sp>
       <p:sp>
         <p:nvSpPr>
-          <p:cNvPr id="3" name="Text Placeholder 2"/>
+          <p:cNvPr id="3" name="Text Placeholder 2">
+            <a:extLst>
+              <a:ext uri="{FF2B5EF4-FFF2-40B4-BE49-F238E27FC236}">
+                <a16:creationId xmlns:a16="http://schemas.microsoft.com/office/drawing/2014/main" id="{DCE6A3DC-F2FE-75EC-9F90-0109FDD0F839}"/>
+              </a:ext>
+            </a:extLst>
+          </p:cNvPr>
           <p:cNvSpPr>
             <a:spLocks noGrp="1"/>
           </p:cNvSpPr>
@@ -1435,99 +1659,99 @@
         </p:nvSpPr>
         <p:spPr>
           <a:xfrm>
-            <a:off x="722313" y="2906713"/>
-            <a:ext cx="7772400" cy="1500187"/>
+            <a:off x="831850" y="4589463"/>
+            <a:ext cx="10515600" cy="1500187"/>
           </a:xfrm>
         </p:spPr>
         <p:txBody>
-          <a:bodyPr anchor="b"/>
+          <a:bodyPr/>
           <a:lstStyle>
             <a:lvl1pPr marL="0" indent="0">
               <a:buNone/>
-              <a:defRPr sz="2000">
+              <a:defRPr sz="2400">
                 <a:solidFill>
                   <a:schemeClr val="tx1">
-                    <a:tint val="75000"/>
+                    <a:tint val="82000"/>
                   </a:schemeClr>
                 </a:solidFill>
               </a:defRPr>
             </a:lvl1pPr>
             <a:lvl2pPr marL="457200" indent="0">
               <a:buNone/>
-              <a:defRPr sz="1800">
+              <a:defRPr sz="2000">
                 <a:solidFill>
                   <a:schemeClr val="tx1">
-                    <a:tint val="75000"/>
+                    <a:tint val="82000"/>
                   </a:schemeClr>
                 </a:solidFill>
               </a:defRPr>
             </a:lvl2pPr>
             <a:lvl3pPr marL="914400" indent="0">
               <a:buNone/>
-              <a:defRPr sz="1600">
+              <a:defRPr sz="1800">
                 <a:solidFill>
                   <a:schemeClr val="tx1">
-                    <a:tint val="75000"/>
+                    <a:tint val="82000"/>
                   </a:schemeClr>
                 </a:solidFill>
               </a:defRPr>
             </a:lvl3pPr>
             <a:lvl4pPr marL="1371600" indent="0">
               <a:buNone/>
-              <a:defRPr sz="1400">
+              <a:defRPr sz="1600">
                 <a:solidFill>
                   <a:schemeClr val="tx1">
-                    <a:tint val="75000"/>
+                    <a:tint val="82000"/>
                   </a:schemeClr>
                 </a:solidFill>
               </a:defRPr>
             </a:lvl4pPr>
             <a:lvl5pPr marL="1828800" indent="0">
               <a:buNone/>
-              <a:defRPr sz="1400">
+              <a:defRPr sz="1600">
                 <a:solidFill>
                   <a:schemeClr val="tx1">
-                    <a:tint val="75000"/>
+                    <a:tint val="82000"/>
                   </a:schemeClr>
                 </a:solidFill>
               </a:defRPr>
             </a:lvl5pPr>
             <a:lvl6pPr marL="2286000" indent="0">
               <a:buNone/>
-              <a:defRPr sz="1400">
+              <a:defRPr sz="1600">
                 <a:solidFill>
                   <a:schemeClr val="tx1">
-                    <a:tint val="75000"/>
+                    <a:tint val="82000"/>
                   </a:schemeClr>
                 </a:solidFill>
               </a:defRPr>
             </a:lvl6pPr>
             <a:lvl7pPr marL="2743200" indent="0">
               <a:buNone/>
-              <a:defRPr sz="1400">
+              <a:defRPr sz="1600">
                 <a:solidFill>
                   <a:schemeClr val="tx1">
-                    <a:tint val="75000"/>
+                    <a:tint val="82000"/>
                   </a:schemeClr>
                 </a:solidFill>
               </a:defRPr>
             </a:lvl7pPr>
             <a:lvl8pPr marL="3200400" indent="0">
               <a:buNone/>
-              <a:defRPr sz="1400">
+              <a:defRPr sz="1600">
                 <a:solidFill>
                   <a:schemeClr val="tx1">
-                    <a:tint val="75000"/>
+                    <a:tint val="82000"/>
                   </a:schemeClr>
                 </a:solidFill>
               </a:defRPr>
             </a:lvl8pPr>
             <a:lvl9pPr marL="3657600" indent="0">
               <a:buNone/>
-              <a:defRPr sz="1400">
+              <a:defRPr sz="1600">
                 <a:solidFill>
                   <a:schemeClr val="tx1">
-                    <a:tint val="75000"/>
+                    <a:tint val="82000"/>
                   </a:schemeClr>
                 </a:solidFill>
               </a:defRPr>
@@ -1544,7 +1768,13 @@
       </p:sp>
       <p:sp>
         <p:nvSpPr>
-          <p:cNvPr id="4" name="Date Placeholder 3"/>
+          <p:cNvPr id="4" name="Date Placeholder 3">
+            <a:extLst>
+              <a:ext uri="{FF2B5EF4-FFF2-40B4-BE49-F238E27FC236}">
+                <a16:creationId xmlns:a16="http://schemas.microsoft.com/office/drawing/2014/main" id="{FB6E9297-5377-8E46-1AD1-1DD60493EE00}"/>
+              </a:ext>
+            </a:extLst>
+          </p:cNvPr>
           <p:cNvSpPr>
             <a:spLocks noGrp="1"/>
           </p:cNvSpPr>
@@ -1567,7 +1797,13 @@
       </p:sp>
       <p:sp>
         <p:nvSpPr>
-          <p:cNvPr id="5" name="Footer Placeholder 4"/>
+          <p:cNvPr id="5" name="Footer Placeholder 4">
+            <a:extLst>
+              <a:ext uri="{FF2B5EF4-FFF2-40B4-BE49-F238E27FC236}">
+                <a16:creationId xmlns:a16="http://schemas.microsoft.com/office/drawing/2014/main" id="{E015C96F-08B6-00AF-C962-37FC2945C6EC}"/>
+              </a:ext>
+            </a:extLst>
+          </p:cNvPr>
           <p:cNvSpPr>
             <a:spLocks noGrp="1"/>
           </p:cNvSpPr>
@@ -1586,7 +1822,13 @@
       </p:sp>
       <p:sp>
         <p:nvSpPr>
-          <p:cNvPr id="6" name="Slide Number Placeholder 5"/>
+          <p:cNvPr id="6" name="Slide Number Placeholder 5">
+            <a:extLst>
+              <a:ext uri="{FF2B5EF4-FFF2-40B4-BE49-F238E27FC236}">
+                <a16:creationId xmlns:a16="http://schemas.microsoft.com/office/drawing/2014/main" id="{1803628A-B608-6BA6-F5D0-C8FF233C1AB4}"/>
+              </a:ext>
+            </a:extLst>
+          </p:cNvPr>
           <p:cNvSpPr>
             <a:spLocks noGrp="1"/>
           </p:cNvSpPr>
@@ -1610,7 +1852,7 @@
     </p:spTree>
     <p:extLst>
       <p:ext uri="{BB962C8B-B14F-4D97-AF65-F5344CB8AC3E}">
-        <p14:creationId xmlns:p14="http://schemas.microsoft.com/office/powerpoint/2010/main" val="960648375"/>
+        <p14:creationId xmlns:p14="http://schemas.microsoft.com/office/powerpoint/2010/main" val="1300344518"/>
       </p:ext>
     </p:extLst>
   </p:cSld>
@@ -1639,7 +1881,13 @@
       </p:grpSpPr>
       <p:sp>
         <p:nvSpPr>
-          <p:cNvPr id="2" name="Title 1"/>
+          <p:cNvPr id="2" name="Title 1">
+            <a:extLst>
+              <a:ext uri="{FF2B5EF4-FFF2-40B4-BE49-F238E27FC236}">
+                <a16:creationId xmlns:a16="http://schemas.microsoft.com/office/drawing/2014/main" id="{61BE653E-E1B9-64C0-1DFA-F3896BC14B10}"/>
+              </a:ext>
+            </a:extLst>
+          </p:cNvPr>
           <p:cNvSpPr>
             <a:spLocks noGrp="1"/>
           </p:cNvSpPr>
@@ -1661,7 +1909,13 @@
       </p:sp>
       <p:sp>
         <p:nvSpPr>
-          <p:cNvPr id="3" name="Content Placeholder 2"/>
+          <p:cNvPr id="3" name="Content Placeholder 2">
+            <a:extLst>
+              <a:ext uri="{FF2B5EF4-FFF2-40B4-BE49-F238E27FC236}">
+                <a16:creationId xmlns:a16="http://schemas.microsoft.com/office/drawing/2014/main" id="{7D5BB3C0-2B6C-0D60-FD99-77A76A3FA3E6}"/>
+              </a:ext>
+            </a:extLst>
+          </p:cNvPr>
           <p:cNvSpPr>
             <a:spLocks noGrp="1"/>
           </p:cNvSpPr>
@@ -1671,41 +1925,13 @@
         </p:nvSpPr>
         <p:spPr>
           <a:xfrm>
-            <a:off x="457200" y="1600200"/>
-            <a:ext cx="4038600" cy="4525963"/>
+            <a:off x="838200" y="1825625"/>
+            <a:ext cx="5181600" cy="4351338"/>
           </a:xfrm>
         </p:spPr>
         <p:txBody>
           <a:bodyPr/>
-          <a:lstStyle>
-            <a:lvl1pPr>
-              <a:defRPr sz="2800"/>
-            </a:lvl1pPr>
-            <a:lvl2pPr>
-              <a:defRPr sz="2400"/>
-            </a:lvl2pPr>
-            <a:lvl3pPr>
-              <a:defRPr sz="2000"/>
-            </a:lvl3pPr>
-            <a:lvl4pPr>
-              <a:defRPr sz="1800"/>
-            </a:lvl4pPr>
-            <a:lvl5pPr>
-              <a:defRPr sz="1800"/>
-            </a:lvl5pPr>
-            <a:lvl6pPr>
-              <a:defRPr sz="1800"/>
-            </a:lvl6pPr>
-            <a:lvl7pPr>
-              <a:defRPr sz="1800"/>
-            </a:lvl7pPr>
-            <a:lvl8pPr>
-              <a:defRPr sz="1800"/>
-            </a:lvl8pPr>
-            <a:lvl9pPr>
-              <a:defRPr sz="1800"/>
-            </a:lvl9pPr>
-          </a:lstStyle>
+          <a:lstStyle/>
           <a:p>
             <a:pPr lvl="0"/>
             <a:r>
@@ -1745,7 +1971,13 @@
       </p:sp>
       <p:sp>
         <p:nvSpPr>
-          <p:cNvPr id="4" name="Content Placeholder 3"/>
+          <p:cNvPr id="4" name="Content Placeholder 3">
+            <a:extLst>
+              <a:ext uri="{FF2B5EF4-FFF2-40B4-BE49-F238E27FC236}">
+                <a16:creationId xmlns:a16="http://schemas.microsoft.com/office/drawing/2014/main" id="{7E6A3119-A65A-2286-2AFD-1EAEA7AE966B}"/>
+              </a:ext>
+            </a:extLst>
+          </p:cNvPr>
           <p:cNvSpPr>
             <a:spLocks noGrp="1"/>
           </p:cNvSpPr>
@@ -1755,41 +1987,13 @@
         </p:nvSpPr>
         <p:spPr>
           <a:xfrm>
-            <a:off x="4648200" y="1600200"/>
-            <a:ext cx="4038600" cy="4525963"/>
+            <a:off x="6172200" y="1825625"/>
+            <a:ext cx="5181600" cy="4351338"/>
           </a:xfrm>
         </p:spPr>
         <p:txBody>
           <a:bodyPr/>
-          <a:lstStyle>
-            <a:lvl1pPr>
-              <a:defRPr sz="2800"/>
-            </a:lvl1pPr>
-            <a:lvl2pPr>
-              <a:defRPr sz="2400"/>
-            </a:lvl2pPr>
-            <a:lvl3pPr>
-              <a:defRPr sz="2000"/>
-            </a:lvl3pPr>
-            <a:lvl4pPr>
-              <a:defRPr sz="1800"/>
-            </a:lvl4pPr>
-            <a:lvl5pPr>
-              <a:defRPr sz="1800"/>
-            </a:lvl5pPr>
-            <a:lvl6pPr>
-              <a:defRPr sz="1800"/>
-            </a:lvl6pPr>
-            <a:lvl7pPr>
-              <a:defRPr sz="1800"/>
-            </a:lvl7pPr>
-            <a:lvl8pPr>
-              <a:defRPr sz="1800"/>
-            </a:lvl8pPr>
-            <a:lvl9pPr>
-              <a:defRPr sz="1800"/>
-            </a:lvl9pPr>
-          </a:lstStyle>
+          <a:lstStyle/>
           <a:p>
             <a:pPr lvl="0"/>
             <a:r>
@@ -1829,7 +2033,13 @@
       </p:sp>
       <p:sp>
         <p:nvSpPr>
-          <p:cNvPr id="5" name="Date Placeholder 4"/>
+          <p:cNvPr id="5" name="Date Placeholder 4">
+            <a:extLst>
+              <a:ext uri="{FF2B5EF4-FFF2-40B4-BE49-F238E27FC236}">
+                <a16:creationId xmlns:a16="http://schemas.microsoft.com/office/drawing/2014/main" id="{33D8BA4C-ADD8-CBC0-0038-F2F99F153155}"/>
+              </a:ext>
+            </a:extLst>
+          </p:cNvPr>
           <p:cNvSpPr>
             <a:spLocks noGrp="1"/>
           </p:cNvSpPr>
@@ -1852,7 +2062,13 @@
       </p:sp>
       <p:sp>
         <p:nvSpPr>
-          <p:cNvPr id="6" name="Footer Placeholder 5"/>
+          <p:cNvPr id="6" name="Footer Placeholder 5">
+            <a:extLst>
+              <a:ext uri="{FF2B5EF4-FFF2-40B4-BE49-F238E27FC236}">
+                <a16:creationId xmlns:a16="http://schemas.microsoft.com/office/drawing/2014/main" id="{548E8E4C-6963-5120-18DB-54044CF3347F}"/>
+              </a:ext>
+            </a:extLst>
+          </p:cNvPr>
           <p:cNvSpPr>
             <a:spLocks noGrp="1"/>
           </p:cNvSpPr>
@@ -1871,7 +2087,13 @@
       </p:sp>
       <p:sp>
         <p:nvSpPr>
-          <p:cNvPr id="7" name="Slide Number Placeholder 6"/>
+          <p:cNvPr id="7" name="Slide Number Placeholder 6">
+            <a:extLst>
+              <a:ext uri="{FF2B5EF4-FFF2-40B4-BE49-F238E27FC236}">
+                <a16:creationId xmlns:a16="http://schemas.microsoft.com/office/drawing/2014/main" id="{0A6C4F11-D2EC-4888-E958-16D61F1E8594}"/>
+              </a:ext>
+            </a:extLst>
+          </p:cNvPr>
           <p:cNvSpPr>
             <a:spLocks noGrp="1"/>
           </p:cNvSpPr>
@@ -1895,7 +2117,7 @@
     </p:spTree>
     <p:extLst>
       <p:ext uri="{BB962C8B-B14F-4D97-AF65-F5344CB8AC3E}">
-        <p14:creationId xmlns:p14="http://schemas.microsoft.com/office/powerpoint/2010/main" val="2782244947"/>
+        <p14:creationId xmlns:p14="http://schemas.microsoft.com/office/powerpoint/2010/main" val="1551980459"/>
       </p:ext>
     </p:extLst>
   </p:cSld>
@@ -1924,44 +2146,57 @@
       </p:grpSpPr>
       <p:sp>
         <p:nvSpPr>
-          <p:cNvPr id="2" name="Title 1"/>
+          <p:cNvPr id="2" name="Title 1">
+            <a:extLst>
+              <a:ext uri="{FF2B5EF4-FFF2-40B4-BE49-F238E27FC236}">
+                <a16:creationId xmlns:a16="http://schemas.microsoft.com/office/drawing/2014/main" id="{13F97CC5-4465-B03F-68F0-42B684B90F51}"/>
+              </a:ext>
+            </a:extLst>
+          </p:cNvPr>
           <p:cNvSpPr>
             <a:spLocks noGrp="1"/>
           </p:cNvSpPr>
           <p:nvPr>
             <p:ph type="title"/>
-          </p:nvPr>
-        </p:nvSpPr>
-        <p:spPr/>
-        <p:txBody>
-          <a:bodyPr/>
-          <a:lstStyle>
-            <a:lvl1pPr>
-              <a:defRPr/>
-            </a:lvl1pPr>
-          </a:lstStyle>
-          <a:p>
-            <a:r>
-              <a:rPr lang="en-US"/>
-              <a:t>Click to edit Master title style</a:t>
-            </a:r>
-          </a:p>
-        </p:txBody>
-      </p:sp>
-      <p:sp>
-        <p:nvSpPr>
-          <p:cNvPr id="3" name="Text Placeholder 2"/>
-          <p:cNvSpPr>
-            <a:spLocks noGrp="1"/>
-          </p:cNvSpPr>
-          <p:nvPr>
-            <p:ph type="body" idx="1"/>
           </p:nvPr>
         </p:nvSpPr>
         <p:spPr>
           <a:xfrm>
-            <a:off x="457200" y="1535113"/>
-            <a:ext cx="4040188" cy="639762"/>
+            <a:off x="839788" y="365125"/>
+            <a:ext cx="10515600" cy="1325563"/>
+          </a:xfrm>
+        </p:spPr>
+        <p:txBody>
+          <a:bodyPr/>
+          <a:lstStyle/>
+          <a:p>
+            <a:r>
+              <a:rPr lang="en-US"/>
+              <a:t>Click to edit Master title style</a:t>
+            </a:r>
+          </a:p>
+        </p:txBody>
+      </p:sp>
+      <p:sp>
+        <p:nvSpPr>
+          <p:cNvPr id="3" name="Text Placeholder 2">
+            <a:extLst>
+              <a:ext uri="{FF2B5EF4-FFF2-40B4-BE49-F238E27FC236}">
+                <a16:creationId xmlns:a16="http://schemas.microsoft.com/office/drawing/2014/main" id="{C1A83FF2-4EE4-4642-79E1-0BC5ABFF3F1B}"/>
+              </a:ext>
+            </a:extLst>
+          </p:cNvPr>
+          <p:cNvSpPr>
+            <a:spLocks noGrp="1"/>
+          </p:cNvSpPr>
+          <p:nvPr>
+            <p:ph type="body" idx="1"/>
+          </p:nvPr>
+        </p:nvSpPr>
+        <p:spPr>
+          <a:xfrm>
+            <a:off x="839788" y="1681163"/>
+            <a:ext cx="5157787" cy="823912"/>
           </a:xfrm>
         </p:spPr>
         <p:txBody>
@@ -2015,7 +2250,13 @@
       </p:sp>
       <p:sp>
         <p:nvSpPr>
-          <p:cNvPr id="4" name="Content Placeholder 3"/>
+          <p:cNvPr id="4" name="Content Placeholder 3">
+            <a:extLst>
+              <a:ext uri="{FF2B5EF4-FFF2-40B4-BE49-F238E27FC236}">
+                <a16:creationId xmlns:a16="http://schemas.microsoft.com/office/drawing/2014/main" id="{52F8ACAA-AB99-C323-7C6C-5B6DB445E1B9}"/>
+              </a:ext>
+            </a:extLst>
+          </p:cNvPr>
           <p:cNvSpPr>
             <a:spLocks noGrp="1"/>
           </p:cNvSpPr>
@@ -2025,41 +2266,13 @@
         </p:nvSpPr>
         <p:spPr>
           <a:xfrm>
-            <a:off x="457200" y="2174875"/>
-            <a:ext cx="4040188" cy="3951288"/>
+            <a:off x="839788" y="2505075"/>
+            <a:ext cx="5157787" cy="3684588"/>
           </a:xfrm>
         </p:spPr>
         <p:txBody>
           <a:bodyPr/>
-          <a:lstStyle>
-            <a:lvl1pPr>
-              <a:defRPr sz="2400"/>
-            </a:lvl1pPr>
-            <a:lvl2pPr>
-              <a:defRPr sz="2000"/>
-            </a:lvl2pPr>
-            <a:lvl3pPr>
-              <a:defRPr sz="1800"/>
-            </a:lvl3pPr>
-            <a:lvl4pPr>
-              <a:defRPr sz="1600"/>
-            </a:lvl4pPr>
-            <a:lvl5pPr>
-              <a:defRPr sz="1600"/>
-            </a:lvl5pPr>
-            <a:lvl6pPr>
-              <a:defRPr sz="1600"/>
-            </a:lvl6pPr>
-            <a:lvl7pPr>
-              <a:defRPr sz="1600"/>
-            </a:lvl7pPr>
-            <a:lvl8pPr>
-              <a:defRPr sz="1600"/>
-            </a:lvl8pPr>
-            <a:lvl9pPr>
-              <a:defRPr sz="1600"/>
-            </a:lvl9pPr>
-          </a:lstStyle>
+          <a:lstStyle/>
           <a:p>
             <a:pPr lvl="0"/>
             <a:r>
@@ -2099,7 +2312,13 @@
       </p:sp>
       <p:sp>
         <p:nvSpPr>
-          <p:cNvPr id="5" name="Text Placeholder 4"/>
+          <p:cNvPr id="5" name="Text Placeholder 4">
+            <a:extLst>
+              <a:ext uri="{FF2B5EF4-FFF2-40B4-BE49-F238E27FC236}">
+                <a16:creationId xmlns:a16="http://schemas.microsoft.com/office/drawing/2014/main" id="{58E1B0B0-7D3C-875A-B3FF-6641A5B07F39}"/>
+              </a:ext>
+            </a:extLst>
+          </p:cNvPr>
           <p:cNvSpPr>
             <a:spLocks noGrp="1"/>
           </p:cNvSpPr>
@@ -2109,8 +2328,8 @@
         </p:nvSpPr>
         <p:spPr>
           <a:xfrm>
-            <a:off x="4645025" y="1535113"/>
-            <a:ext cx="4041775" cy="639762"/>
+            <a:off x="6172200" y="1681163"/>
+            <a:ext cx="5183188" cy="823912"/>
           </a:xfrm>
         </p:spPr>
         <p:txBody>
@@ -2164,7 +2383,13 @@
       </p:sp>
       <p:sp>
         <p:nvSpPr>
-          <p:cNvPr id="6" name="Content Placeholder 5"/>
+          <p:cNvPr id="6" name="Content Placeholder 5">
+            <a:extLst>
+              <a:ext uri="{FF2B5EF4-FFF2-40B4-BE49-F238E27FC236}">
+                <a16:creationId xmlns:a16="http://schemas.microsoft.com/office/drawing/2014/main" id="{1507BEE9-6DA1-3B20-49B2-291367BE505D}"/>
+              </a:ext>
+            </a:extLst>
+          </p:cNvPr>
           <p:cNvSpPr>
             <a:spLocks noGrp="1"/>
           </p:cNvSpPr>
@@ -2174,41 +2399,13 @@
         </p:nvSpPr>
         <p:spPr>
           <a:xfrm>
-            <a:off x="4645025" y="2174875"/>
-            <a:ext cx="4041775" cy="3951288"/>
+            <a:off x="6172200" y="2505075"/>
+            <a:ext cx="5183188" cy="3684588"/>
           </a:xfrm>
         </p:spPr>
         <p:txBody>
           <a:bodyPr/>
-          <a:lstStyle>
-            <a:lvl1pPr>
-              <a:defRPr sz="2400"/>
-            </a:lvl1pPr>
-            <a:lvl2pPr>
-              <a:defRPr sz="2000"/>
-            </a:lvl2pPr>
-            <a:lvl3pPr>
-              <a:defRPr sz="1800"/>
-            </a:lvl3pPr>
-            <a:lvl4pPr>
-              <a:defRPr sz="1600"/>
-            </a:lvl4pPr>
-            <a:lvl5pPr>
-              <a:defRPr sz="1600"/>
-            </a:lvl5pPr>
-            <a:lvl6pPr>
-              <a:defRPr sz="1600"/>
-            </a:lvl6pPr>
-            <a:lvl7pPr>
-              <a:defRPr sz="1600"/>
-            </a:lvl7pPr>
-            <a:lvl8pPr>
-              <a:defRPr sz="1600"/>
-            </a:lvl8pPr>
-            <a:lvl9pPr>
-              <a:defRPr sz="1600"/>
-            </a:lvl9pPr>
-          </a:lstStyle>
+          <a:lstStyle/>
           <a:p>
             <a:pPr lvl="0"/>
             <a:r>
@@ -2248,7 +2445,13 @@
       </p:sp>
       <p:sp>
         <p:nvSpPr>
-          <p:cNvPr id="7" name="Date Placeholder 6"/>
+          <p:cNvPr id="7" name="Date Placeholder 6">
+            <a:extLst>
+              <a:ext uri="{FF2B5EF4-FFF2-40B4-BE49-F238E27FC236}">
+                <a16:creationId xmlns:a16="http://schemas.microsoft.com/office/drawing/2014/main" id="{545DAB54-C703-B4FD-4D4E-04865A4D7376}"/>
+              </a:ext>
+            </a:extLst>
+          </p:cNvPr>
           <p:cNvSpPr>
             <a:spLocks noGrp="1"/>
           </p:cNvSpPr>
@@ -2271,7 +2474,13 @@
       </p:sp>
       <p:sp>
         <p:nvSpPr>
-          <p:cNvPr id="8" name="Footer Placeholder 7"/>
+          <p:cNvPr id="8" name="Footer Placeholder 7">
+            <a:extLst>
+              <a:ext uri="{FF2B5EF4-FFF2-40B4-BE49-F238E27FC236}">
+                <a16:creationId xmlns:a16="http://schemas.microsoft.com/office/drawing/2014/main" id="{1E4CB323-74F5-4D0A-8205-FB4459C43200}"/>
+              </a:ext>
+            </a:extLst>
+          </p:cNvPr>
           <p:cNvSpPr>
             <a:spLocks noGrp="1"/>
           </p:cNvSpPr>
@@ -2290,7 +2499,13 @@
       </p:sp>
       <p:sp>
         <p:nvSpPr>
-          <p:cNvPr id="9" name="Slide Number Placeholder 8"/>
+          <p:cNvPr id="9" name="Slide Number Placeholder 8">
+            <a:extLst>
+              <a:ext uri="{FF2B5EF4-FFF2-40B4-BE49-F238E27FC236}">
+                <a16:creationId xmlns:a16="http://schemas.microsoft.com/office/drawing/2014/main" id="{C77E8ADC-2F80-259E-1208-6B230ADFB9B0}"/>
+              </a:ext>
+            </a:extLst>
+          </p:cNvPr>
           <p:cNvSpPr>
             <a:spLocks noGrp="1"/>
           </p:cNvSpPr>
@@ -2314,7 +2529,7 @@
     </p:spTree>
     <p:extLst>
       <p:ext uri="{BB962C8B-B14F-4D97-AF65-F5344CB8AC3E}">
-        <p14:creationId xmlns:p14="http://schemas.microsoft.com/office/powerpoint/2010/main" val="990158736"/>
+        <p14:creationId xmlns:p14="http://schemas.microsoft.com/office/powerpoint/2010/main" val="3983027492"/>
       </p:ext>
     </p:extLst>
   </p:cSld>
@@ -2343,7 +2558,13 @@
       </p:grpSpPr>
       <p:sp>
         <p:nvSpPr>
-          <p:cNvPr id="2" name="Title 1"/>
+          <p:cNvPr id="2" name="Title 1">
+            <a:extLst>
+              <a:ext uri="{FF2B5EF4-FFF2-40B4-BE49-F238E27FC236}">
+                <a16:creationId xmlns:a16="http://schemas.microsoft.com/office/drawing/2014/main" id="{4B2E87B3-EDF9-1499-E0C2-DC352811E7B7}"/>
+              </a:ext>
+            </a:extLst>
+          </p:cNvPr>
           <p:cNvSpPr>
             <a:spLocks noGrp="1"/>
           </p:cNvSpPr>
@@ -2365,7 +2586,13 @@
       </p:sp>
       <p:sp>
         <p:nvSpPr>
-          <p:cNvPr id="3" name="Date Placeholder 2"/>
+          <p:cNvPr id="3" name="Date Placeholder 2">
+            <a:extLst>
+              <a:ext uri="{FF2B5EF4-FFF2-40B4-BE49-F238E27FC236}">
+                <a16:creationId xmlns:a16="http://schemas.microsoft.com/office/drawing/2014/main" id="{BC947380-C45A-BEE5-3738-E08F1ED9FEC8}"/>
+              </a:ext>
+            </a:extLst>
+          </p:cNvPr>
           <p:cNvSpPr>
             <a:spLocks noGrp="1"/>
           </p:cNvSpPr>
@@ -2388,7 +2615,13 @@
       </p:sp>
       <p:sp>
         <p:nvSpPr>
-          <p:cNvPr id="4" name="Footer Placeholder 3"/>
+          <p:cNvPr id="4" name="Footer Placeholder 3">
+            <a:extLst>
+              <a:ext uri="{FF2B5EF4-FFF2-40B4-BE49-F238E27FC236}">
+                <a16:creationId xmlns:a16="http://schemas.microsoft.com/office/drawing/2014/main" id="{8871BDD7-5409-141A-B0DB-FF1377C92BAC}"/>
+              </a:ext>
+            </a:extLst>
+          </p:cNvPr>
           <p:cNvSpPr>
             <a:spLocks noGrp="1"/>
           </p:cNvSpPr>
@@ -2407,7 +2640,13 @@
       </p:sp>
       <p:sp>
         <p:nvSpPr>
-          <p:cNvPr id="5" name="Slide Number Placeholder 4"/>
+          <p:cNvPr id="5" name="Slide Number Placeholder 4">
+            <a:extLst>
+              <a:ext uri="{FF2B5EF4-FFF2-40B4-BE49-F238E27FC236}">
+                <a16:creationId xmlns:a16="http://schemas.microsoft.com/office/drawing/2014/main" id="{CF0B744A-8D6E-B1EC-AD3A-23AFF04FD6A0}"/>
+              </a:ext>
+            </a:extLst>
+          </p:cNvPr>
           <p:cNvSpPr>
             <a:spLocks noGrp="1"/>
           </p:cNvSpPr>
@@ -2431,7 +2670,7 @@
     </p:spTree>
     <p:extLst>
       <p:ext uri="{BB962C8B-B14F-4D97-AF65-F5344CB8AC3E}">
-        <p14:creationId xmlns:p14="http://schemas.microsoft.com/office/powerpoint/2010/main" val="727027711"/>
+        <p14:creationId xmlns:p14="http://schemas.microsoft.com/office/powerpoint/2010/main" val="1327437069"/>
       </p:ext>
     </p:extLst>
   </p:cSld>
@@ -2460,7 +2699,13 @@
       </p:grpSpPr>
       <p:sp>
         <p:nvSpPr>
-          <p:cNvPr id="2" name="Date Placeholder 1"/>
+          <p:cNvPr id="2" name="Date Placeholder 1">
+            <a:extLst>
+              <a:ext uri="{FF2B5EF4-FFF2-40B4-BE49-F238E27FC236}">
+                <a16:creationId xmlns:a16="http://schemas.microsoft.com/office/drawing/2014/main" id="{79B11137-32BA-00D4-DD01-7D1D03C99CC0}"/>
+              </a:ext>
+            </a:extLst>
+          </p:cNvPr>
           <p:cNvSpPr>
             <a:spLocks noGrp="1"/>
           </p:cNvSpPr>
@@ -2483,7 +2728,13 @@
       </p:sp>
       <p:sp>
         <p:nvSpPr>
-          <p:cNvPr id="3" name="Footer Placeholder 2"/>
+          <p:cNvPr id="3" name="Footer Placeholder 2">
+            <a:extLst>
+              <a:ext uri="{FF2B5EF4-FFF2-40B4-BE49-F238E27FC236}">
+                <a16:creationId xmlns:a16="http://schemas.microsoft.com/office/drawing/2014/main" id="{FBEAC000-E703-3FF7-ACAC-509EB35BA1E7}"/>
+              </a:ext>
+            </a:extLst>
+          </p:cNvPr>
           <p:cNvSpPr>
             <a:spLocks noGrp="1"/>
           </p:cNvSpPr>
@@ -2502,7 +2753,13 @@
       </p:sp>
       <p:sp>
         <p:nvSpPr>
-          <p:cNvPr id="4" name="Slide Number Placeholder 3"/>
+          <p:cNvPr id="4" name="Slide Number Placeholder 3">
+            <a:extLst>
+              <a:ext uri="{FF2B5EF4-FFF2-40B4-BE49-F238E27FC236}">
+                <a16:creationId xmlns:a16="http://schemas.microsoft.com/office/drawing/2014/main" id="{9D70553F-BA08-1EC3-DEEC-A97360609E58}"/>
+              </a:ext>
+            </a:extLst>
+          </p:cNvPr>
           <p:cNvSpPr>
             <a:spLocks noGrp="1"/>
           </p:cNvSpPr>
@@ -2526,7 +2783,7 @@
     </p:spTree>
     <p:extLst>
       <p:ext uri="{BB962C8B-B14F-4D97-AF65-F5344CB8AC3E}">
-        <p14:creationId xmlns:p14="http://schemas.microsoft.com/office/powerpoint/2010/main" val="1212999818"/>
+        <p14:creationId xmlns:p14="http://schemas.microsoft.com/office/powerpoint/2010/main" val="1642827696"/>
       </p:ext>
     </p:extLst>
   </p:cSld>
@@ -2555,7 +2812,13 @@
       </p:grpSpPr>
       <p:sp>
         <p:nvSpPr>
-          <p:cNvPr id="2" name="Title 1"/>
+          <p:cNvPr id="2" name="Title 1">
+            <a:extLst>
+              <a:ext uri="{FF2B5EF4-FFF2-40B4-BE49-F238E27FC236}">
+                <a16:creationId xmlns:a16="http://schemas.microsoft.com/office/drawing/2014/main" id="{E2EFE04B-68A1-DB22-A5CA-026A7E8A75FE}"/>
+              </a:ext>
+            </a:extLst>
+          </p:cNvPr>
           <p:cNvSpPr>
             <a:spLocks noGrp="1"/>
           </p:cNvSpPr>
@@ -2565,15 +2828,15 @@
         </p:nvSpPr>
         <p:spPr>
           <a:xfrm>
-            <a:off x="457200" y="273050"/>
-            <a:ext cx="3008313" cy="1162050"/>
+            <a:off x="839788" y="457200"/>
+            <a:ext cx="3932237" cy="1600200"/>
           </a:xfrm>
         </p:spPr>
         <p:txBody>
           <a:bodyPr anchor="b"/>
           <a:lstStyle>
-            <a:lvl1pPr algn="l">
-              <a:defRPr sz="2000" b="1"/>
+            <a:lvl1pPr>
+              <a:defRPr sz="3200"/>
             </a:lvl1pPr>
           </a:lstStyle>
           <a:p>
@@ -2586,7 +2849,13 @@
       </p:sp>
       <p:sp>
         <p:nvSpPr>
-          <p:cNvPr id="3" name="Content Placeholder 2"/>
+          <p:cNvPr id="3" name="Content Placeholder 2">
+            <a:extLst>
+              <a:ext uri="{FF2B5EF4-FFF2-40B4-BE49-F238E27FC236}">
+                <a16:creationId xmlns:a16="http://schemas.microsoft.com/office/drawing/2014/main" id="{BC3150BB-303C-3370-C22B-251F1BAAE8CF}"/>
+              </a:ext>
+            </a:extLst>
+          </p:cNvPr>
           <p:cNvSpPr>
             <a:spLocks noGrp="1"/>
           </p:cNvSpPr>
@@ -2596,8 +2865,8 @@
         </p:nvSpPr>
         <p:spPr>
           <a:xfrm>
-            <a:off x="3575050" y="273050"/>
-            <a:ext cx="5111750" cy="5853113"/>
+            <a:off x="5183188" y="987425"/>
+            <a:ext cx="6172200" cy="4873625"/>
           </a:xfrm>
         </p:spPr>
         <p:txBody>
@@ -2670,7 +2939,13 @@
       </p:sp>
       <p:sp>
         <p:nvSpPr>
-          <p:cNvPr id="4" name="Text Placeholder 3"/>
+          <p:cNvPr id="4" name="Text Placeholder 3">
+            <a:extLst>
+              <a:ext uri="{FF2B5EF4-FFF2-40B4-BE49-F238E27FC236}">
+                <a16:creationId xmlns:a16="http://schemas.microsoft.com/office/drawing/2014/main" id="{4DE577DE-3D9C-F0A7-84A1-CA98166CE6FA}"/>
+              </a:ext>
+            </a:extLst>
+          </p:cNvPr>
           <p:cNvSpPr>
             <a:spLocks noGrp="1"/>
           </p:cNvSpPr>
@@ -2680,8 +2955,8 @@
         </p:nvSpPr>
         <p:spPr>
           <a:xfrm>
-            <a:off x="457200" y="1435100"/>
-            <a:ext cx="3008313" cy="4691063"/>
+            <a:off x="839788" y="2057400"/>
+            <a:ext cx="3932237" cy="3811588"/>
           </a:xfrm>
         </p:spPr>
         <p:txBody>
@@ -2689,39 +2964,39 @@
           <a:lstStyle>
             <a:lvl1pPr marL="0" indent="0">
               <a:buNone/>
-              <a:defRPr sz="1400"/>
+              <a:defRPr sz="1600"/>
             </a:lvl1pPr>
             <a:lvl2pPr marL="457200" indent="0">
               <a:buNone/>
-              <a:defRPr sz="1200"/>
+              <a:defRPr sz="1400"/>
             </a:lvl2pPr>
             <a:lvl3pPr marL="914400" indent="0">
               <a:buNone/>
-              <a:defRPr sz="1000"/>
+              <a:defRPr sz="1200"/>
             </a:lvl3pPr>
             <a:lvl4pPr marL="1371600" indent="0">
               <a:buNone/>
-              <a:defRPr sz="900"/>
+              <a:defRPr sz="1000"/>
             </a:lvl4pPr>
             <a:lvl5pPr marL="1828800" indent="0">
               <a:buNone/>
-              <a:defRPr sz="900"/>
+              <a:defRPr sz="1000"/>
             </a:lvl5pPr>
             <a:lvl6pPr marL="2286000" indent="0">
               <a:buNone/>
-              <a:defRPr sz="900"/>
+              <a:defRPr sz="1000"/>
             </a:lvl6pPr>
             <a:lvl7pPr marL="2743200" indent="0">
               <a:buNone/>
-              <a:defRPr sz="900"/>
+              <a:defRPr sz="1000"/>
             </a:lvl7pPr>
             <a:lvl8pPr marL="3200400" indent="0">
               <a:buNone/>
-              <a:defRPr sz="900"/>
+              <a:defRPr sz="1000"/>
             </a:lvl8pPr>
             <a:lvl9pPr marL="3657600" indent="0">
               <a:buNone/>
-              <a:defRPr sz="900"/>
+              <a:defRPr sz="1000"/>
             </a:lvl9pPr>
           </a:lstStyle>
           <a:p>
@@ -2735,7 +3010,13 @@
       </p:sp>
       <p:sp>
         <p:nvSpPr>
-          <p:cNvPr id="5" name="Date Placeholder 4"/>
+          <p:cNvPr id="5" name="Date Placeholder 4">
+            <a:extLst>
+              <a:ext uri="{FF2B5EF4-FFF2-40B4-BE49-F238E27FC236}">
+                <a16:creationId xmlns:a16="http://schemas.microsoft.com/office/drawing/2014/main" id="{809E3CAA-A856-E048-4460-82661E804468}"/>
+              </a:ext>
+            </a:extLst>
+          </p:cNvPr>
           <p:cNvSpPr>
             <a:spLocks noGrp="1"/>
           </p:cNvSpPr>
@@ -2758,7 +3039,13 @@
       </p:sp>
       <p:sp>
         <p:nvSpPr>
-          <p:cNvPr id="6" name="Footer Placeholder 5"/>
+          <p:cNvPr id="6" name="Footer Placeholder 5">
+            <a:extLst>
+              <a:ext uri="{FF2B5EF4-FFF2-40B4-BE49-F238E27FC236}">
+                <a16:creationId xmlns:a16="http://schemas.microsoft.com/office/drawing/2014/main" id="{C35A1D76-776A-E17B-FE7F-7F6E02AE91F1}"/>
+              </a:ext>
+            </a:extLst>
+          </p:cNvPr>
           <p:cNvSpPr>
             <a:spLocks noGrp="1"/>
           </p:cNvSpPr>
@@ -2777,7 +3064,13 @@
       </p:sp>
       <p:sp>
         <p:nvSpPr>
-          <p:cNvPr id="7" name="Slide Number Placeholder 6"/>
+          <p:cNvPr id="7" name="Slide Number Placeholder 6">
+            <a:extLst>
+              <a:ext uri="{FF2B5EF4-FFF2-40B4-BE49-F238E27FC236}">
+                <a16:creationId xmlns:a16="http://schemas.microsoft.com/office/drawing/2014/main" id="{7E2EBB4A-56BC-4F75-562A-8A7382CFE835}"/>
+              </a:ext>
+            </a:extLst>
+          </p:cNvPr>
           <p:cNvSpPr>
             <a:spLocks noGrp="1"/>
           </p:cNvSpPr>
@@ -2801,7 +3094,7 @@
     </p:spTree>
     <p:extLst>
       <p:ext uri="{BB962C8B-B14F-4D97-AF65-F5344CB8AC3E}">
-        <p14:creationId xmlns:p14="http://schemas.microsoft.com/office/powerpoint/2010/main" val="1840726560"/>
+        <p14:creationId xmlns:p14="http://schemas.microsoft.com/office/powerpoint/2010/main" val="2023908364"/>
       </p:ext>
     </p:extLst>
   </p:cSld>
@@ -2830,7 +3123,13 @@
       </p:grpSpPr>
       <p:sp>
         <p:nvSpPr>
-          <p:cNvPr id="2" name="Title 1"/>
+          <p:cNvPr id="2" name="Title 1">
+            <a:extLst>
+              <a:ext uri="{FF2B5EF4-FFF2-40B4-BE49-F238E27FC236}">
+                <a16:creationId xmlns:a16="http://schemas.microsoft.com/office/drawing/2014/main" id="{E977DEA3-F801-DD12-362D-C0362599C6D2}"/>
+              </a:ext>
+            </a:extLst>
+          </p:cNvPr>
           <p:cNvSpPr>
             <a:spLocks noGrp="1"/>
           </p:cNvSpPr>
@@ -2840,15 +3139,15 @@
         </p:nvSpPr>
         <p:spPr>
           <a:xfrm>
-            <a:off x="1792288" y="4800600"/>
-            <a:ext cx="5486400" cy="566738"/>
+            <a:off x="839788" y="457200"/>
+            <a:ext cx="3932237" cy="1600200"/>
           </a:xfrm>
         </p:spPr>
         <p:txBody>
           <a:bodyPr anchor="b"/>
           <a:lstStyle>
-            <a:lvl1pPr algn="l">
-              <a:defRPr sz="2000" b="1"/>
+            <a:lvl1pPr>
+              <a:defRPr sz="3200"/>
             </a:lvl1pPr>
           </a:lstStyle>
           <a:p>
@@ -2861,7 +3160,13 @@
       </p:sp>
       <p:sp>
         <p:nvSpPr>
-          <p:cNvPr id="3" name="Picture Placeholder 2"/>
+          <p:cNvPr id="3" name="Picture Placeholder 2">
+            <a:extLst>
+              <a:ext uri="{FF2B5EF4-FFF2-40B4-BE49-F238E27FC236}">
+                <a16:creationId xmlns:a16="http://schemas.microsoft.com/office/drawing/2014/main" id="{75E9F4F5-D17B-020E-5DAB-823167E3465E}"/>
+              </a:ext>
+            </a:extLst>
+          </p:cNvPr>
           <p:cNvSpPr>
             <a:spLocks noGrp="1"/>
           </p:cNvSpPr>
@@ -2871,8 +3176,8 @@
         </p:nvSpPr>
         <p:spPr>
           <a:xfrm>
-            <a:off x="1792288" y="612775"/>
-            <a:ext cx="5486400" cy="4114800"/>
+            <a:off x="5183188" y="987425"/>
+            <a:ext cx="6172200" cy="4873625"/>
           </a:xfrm>
         </p:spPr>
         <p:txBody>
@@ -2922,7 +3227,13 @@
       </p:sp>
       <p:sp>
         <p:nvSpPr>
-          <p:cNvPr id="4" name="Text Placeholder 3"/>
+          <p:cNvPr id="4" name="Text Placeholder 3">
+            <a:extLst>
+              <a:ext uri="{FF2B5EF4-FFF2-40B4-BE49-F238E27FC236}">
+                <a16:creationId xmlns:a16="http://schemas.microsoft.com/office/drawing/2014/main" id="{C0401E11-65BE-A481-6F43-61E958067AF5}"/>
+              </a:ext>
+            </a:extLst>
+          </p:cNvPr>
           <p:cNvSpPr>
             <a:spLocks noGrp="1"/>
           </p:cNvSpPr>
@@ -2932,8 +3243,8 @@
         </p:nvSpPr>
         <p:spPr>
           <a:xfrm>
-            <a:off x="1792288" y="5367338"/>
-            <a:ext cx="5486400" cy="804862"/>
+            <a:off x="839788" y="2057400"/>
+            <a:ext cx="3932237" cy="3811588"/>
           </a:xfrm>
         </p:spPr>
         <p:txBody>
@@ -2941,39 +3252,39 @@
           <a:lstStyle>
             <a:lvl1pPr marL="0" indent="0">
               <a:buNone/>
-              <a:defRPr sz="1400"/>
+              <a:defRPr sz="1600"/>
             </a:lvl1pPr>
             <a:lvl2pPr marL="457200" indent="0">
               <a:buNone/>
-              <a:defRPr sz="1200"/>
+              <a:defRPr sz="1400"/>
             </a:lvl2pPr>
             <a:lvl3pPr marL="914400" indent="0">
               <a:buNone/>
-              <a:defRPr sz="1000"/>
+              <a:defRPr sz="1200"/>
             </a:lvl3pPr>
             <a:lvl4pPr marL="1371600" indent="0">
               <a:buNone/>
-              <a:defRPr sz="900"/>
+              <a:defRPr sz="1000"/>
             </a:lvl4pPr>
             <a:lvl5pPr marL="1828800" indent="0">
               <a:buNone/>
-              <a:defRPr sz="900"/>
+              <a:defRPr sz="1000"/>
             </a:lvl5pPr>
             <a:lvl6pPr marL="2286000" indent="0">
               <a:buNone/>
-              <a:defRPr sz="900"/>
+              <a:defRPr sz="1000"/>
             </a:lvl6pPr>
             <a:lvl7pPr marL="2743200" indent="0">
               <a:buNone/>
-              <a:defRPr sz="900"/>
+              <a:defRPr sz="1000"/>
             </a:lvl7pPr>
             <a:lvl8pPr marL="3200400" indent="0">
               <a:buNone/>
-              <a:defRPr sz="900"/>
+              <a:defRPr sz="1000"/>
             </a:lvl8pPr>
             <a:lvl9pPr marL="3657600" indent="0">
               <a:buNone/>
-              <a:defRPr sz="900"/>
+              <a:defRPr sz="1000"/>
             </a:lvl9pPr>
           </a:lstStyle>
           <a:p>
@@ -2987,7 +3298,13 @@
       </p:sp>
       <p:sp>
         <p:nvSpPr>
-          <p:cNvPr id="5" name="Date Placeholder 4"/>
+          <p:cNvPr id="5" name="Date Placeholder 4">
+            <a:extLst>
+              <a:ext uri="{FF2B5EF4-FFF2-40B4-BE49-F238E27FC236}">
+                <a16:creationId xmlns:a16="http://schemas.microsoft.com/office/drawing/2014/main" id="{D32816A6-24C1-6F3E-56AC-E937A9C144D9}"/>
+              </a:ext>
+            </a:extLst>
+          </p:cNvPr>
           <p:cNvSpPr>
             <a:spLocks noGrp="1"/>
           </p:cNvSpPr>
@@ -3010,7 +3327,13 @@
       </p:sp>
       <p:sp>
         <p:nvSpPr>
-          <p:cNvPr id="6" name="Footer Placeholder 5"/>
+          <p:cNvPr id="6" name="Footer Placeholder 5">
+            <a:extLst>
+              <a:ext uri="{FF2B5EF4-FFF2-40B4-BE49-F238E27FC236}">
+                <a16:creationId xmlns:a16="http://schemas.microsoft.com/office/drawing/2014/main" id="{4318D5CF-6683-A818-C7C9-D3B2A0E9AD79}"/>
+              </a:ext>
+            </a:extLst>
+          </p:cNvPr>
           <p:cNvSpPr>
             <a:spLocks noGrp="1"/>
           </p:cNvSpPr>
@@ -3029,7 +3352,13 @@
       </p:sp>
       <p:sp>
         <p:nvSpPr>
-          <p:cNvPr id="7" name="Slide Number Placeholder 6"/>
+          <p:cNvPr id="7" name="Slide Number Placeholder 6">
+            <a:extLst>
+              <a:ext uri="{FF2B5EF4-FFF2-40B4-BE49-F238E27FC236}">
+                <a16:creationId xmlns:a16="http://schemas.microsoft.com/office/drawing/2014/main" id="{F213EEA1-E22A-674C-7A7B-72F92C7DE7C9}"/>
+              </a:ext>
+            </a:extLst>
+          </p:cNvPr>
           <p:cNvSpPr>
             <a:spLocks noGrp="1"/>
           </p:cNvSpPr>
@@ -3053,7 +3382,7 @@
     </p:spTree>
     <p:extLst>
       <p:ext uri="{BB962C8B-B14F-4D97-AF65-F5344CB8AC3E}">
-        <p14:creationId xmlns:p14="http://schemas.microsoft.com/office/powerpoint/2010/main" val="3889236939"/>
+        <p14:creationId xmlns:p14="http://schemas.microsoft.com/office/powerpoint/2010/main" val="481959618"/>
       </p:ext>
     </p:extLst>
   </p:cSld>
@@ -3087,7 +3416,13 @@
       </p:grpSpPr>
       <p:sp>
         <p:nvSpPr>
-          <p:cNvPr id="2" name="Title Placeholder 1"/>
+          <p:cNvPr id="2" name="Title Placeholder 1">
+            <a:extLst>
+              <a:ext uri="{FF2B5EF4-FFF2-40B4-BE49-F238E27FC236}">
+                <a16:creationId xmlns:a16="http://schemas.microsoft.com/office/drawing/2014/main" id="{EE2B4AD6-2274-DE41-3400-A311A52A0BCE}"/>
+              </a:ext>
+            </a:extLst>
+          </p:cNvPr>
           <p:cNvSpPr>
             <a:spLocks noGrp="1"/>
           </p:cNvSpPr>
@@ -3097,8 +3432,8 @@
         </p:nvSpPr>
         <p:spPr>
           <a:xfrm>
-            <a:off x="457200" y="274638"/>
-            <a:ext cx="8229600" cy="1143000"/>
+            <a:off x="838200" y="365125"/>
+            <a:ext cx="10515600" cy="1325563"/>
           </a:xfrm>
           <a:prstGeom prst="rect">
             <a:avLst/>
@@ -3119,7 +3454,13 @@
       </p:sp>
       <p:sp>
         <p:nvSpPr>
-          <p:cNvPr id="3" name="Text Placeholder 2"/>
+          <p:cNvPr id="3" name="Text Placeholder 2">
+            <a:extLst>
+              <a:ext uri="{FF2B5EF4-FFF2-40B4-BE49-F238E27FC236}">
+                <a16:creationId xmlns:a16="http://schemas.microsoft.com/office/drawing/2014/main" id="{EBC11907-E3DB-DCF4-94EB-7729592136BF}"/>
+              </a:ext>
+            </a:extLst>
+          </p:cNvPr>
           <p:cNvSpPr>
             <a:spLocks noGrp="1"/>
           </p:cNvSpPr>
@@ -3129,8 +3470,8 @@
         </p:nvSpPr>
         <p:spPr>
           <a:xfrm>
-            <a:off x="457200" y="1600200"/>
-            <a:ext cx="8229600" cy="4525963"/>
+            <a:off x="838200" y="1825625"/>
+            <a:ext cx="10515600" cy="4351338"/>
           </a:xfrm>
           <a:prstGeom prst="rect">
             <a:avLst/>
@@ -3180,7 +3521,13 @@
       </p:sp>
       <p:sp>
         <p:nvSpPr>
-          <p:cNvPr id="4" name="Date Placeholder 3"/>
+          <p:cNvPr id="4" name="Date Placeholder 3">
+            <a:extLst>
+              <a:ext uri="{FF2B5EF4-FFF2-40B4-BE49-F238E27FC236}">
+                <a16:creationId xmlns:a16="http://schemas.microsoft.com/office/drawing/2014/main" id="{DCD0DFA6-1003-D56C-6EE2-B1AB2D6AB27A}"/>
+              </a:ext>
+            </a:extLst>
+          </p:cNvPr>
           <p:cNvSpPr>
             <a:spLocks noGrp="1"/>
           </p:cNvSpPr>
@@ -3190,8 +3537,8 @@
         </p:nvSpPr>
         <p:spPr>
           <a:xfrm>
-            <a:off x="457200" y="6356350"/>
-            <a:ext cx="2133600" cy="365125"/>
+            <a:off x="838200" y="6356350"/>
+            <a:ext cx="2743200" cy="365125"/>
           </a:xfrm>
           <a:prstGeom prst="rect">
             <a:avLst/>
@@ -3204,7 +3551,7 @@
               <a:defRPr sz="1200">
                 <a:solidFill>
                   <a:schemeClr val="tx1">
-                    <a:tint val="75000"/>
+                    <a:tint val="82000"/>
                   </a:schemeClr>
                 </a:solidFill>
               </a:defRPr>
@@ -3221,7 +3568,13 @@
       </p:sp>
       <p:sp>
         <p:nvSpPr>
-          <p:cNvPr id="5" name="Footer Placeholder 4"/>
+          <p:cNvPr id="5" name="Footer Placeholder 4">
+            <a:extLst>
+              <a:ext uri="{FF2B5EF4-FFF2-40B4-BE49-F238E27FC236}">
+                <a16:creationId xmlns:a16="http://schemas.microsoft.com/office/drawing/2014/main" id="{6A4E6E72-29D4-68C7-A2BB-F8FDDC222438}"/>
+              </a:ext>
+            </a:extLst>
+          </p:cNvPr>
           <p:cNvSpPr>
             <a:spLocks noGrp="1"/>
           </p:cNvSpPr>
@@ -3231,8 +3584,8 @@
         </p:nvSpPr>
         <p:spPr>
           <a:xfrm>
-            <a:off x="3124200" y="6356350"/>
-            <a:ext cx="2895600" cy="365125"/>
+            <a:off x="4038600" y="6356350"/>
+            <a:ext cx="4114800" cy="365125"/>
           </a:xfrm>
           <a:prstGeom prst="rect">
             <a:avLst/>
@@ -3245,7 +3598,7 @@
               <a:defRPr sz="1200">
                 <a:solidFill>
                   <a:schemeClr val="tx1">
-                    <a:tint val="75000"/>
+                    <a:tint val="82000"/>
                   </a:schemeClr>
                 </a:solidFill>
               </a:defRPr>
@@ -3258,7 +3611,13 @@
       </p:sp>
       <p:sp>
         <p:nvSpPr>
-          <p:cNvPr id="6" name="Slide Number Placeholder 5"/>
+          <p:cNvPr id="6" name="Slide Number Placeholder 5">
+            <a:extLst>
+              <a:ext uri="{FF2B5EF4-FFF2-40B4-BE49-F238E27FC236}">
+                <a16:creationId xmlns:a16="http://schemas.microsoft.com/office/drawing/2014/main" id="{3974EDD5-BE3F-5E39-CB0E-68AC645CCB4F}"/>
+              </a:ext>
+            </a:extLst>
+          </p:cNvPr>
           <p:cNvSpPr>
             <a:spLocks noGrp="1"/>
           </p:cNvSpPr>
@@ -3268,8 +3627,8 @@
         </p:nvSpPr>
         <p:spPr>
           <a:xfrm>
-            <a:off x="6553200" y="6356350"/>
-            <a:ext cx="2133600" cy="365125"/>
+            <a:off x="8610600" y="6356350"/>
+            <a:ext cx="2743200" cy="365125"/>
           </a:xfrm>
           <a:prstGeom prst="rect">
             <a:avLst/>
@@ -3282,7 +3641,7 @@
               <a:defRPr sz="1200">
                 <a:solidFill>
                   <a:schemeClr val="tx1">
-                    <a:tint val="75000"/>
+                    <a:tint val="82000"/>
                   </a:schemeClr>
                 </a:solidFill>
               </a:defRPr>
@@ -3300,27 +3659,30 @@
     </p:spTree>
     <p:extLst>
       <p:ext uri="{BB962C8B-B14F-4D97-AF65-F5344CB8AC3E}">
-        <p14:creationId xmlns:p14="http://schemas.microsoft.com/office/powerpoint/2010/main" val="2209977519"/>
+        <p14:creationId xmlns:p14="http://schemas.microsoft.com/office/powerpoint/2010/main" val="274831299"/>
       </p:ext>
     </p:extLst>
   </p:cSld>
   <p:clrMap bg1="lt1" tx1="dk1" bg2="lt2" tx2="dk2" accent1="accent1" accent2="accent2" accent3="accent3" accent4="accent4" accent5="accent5" accent6="accent6" hlink="hlink" folHlink="folHlink"/>
   <p:sldLayoutIdLst>
-    <p:sldLayoutId id="2147483649" r:id="rId1"/>
-    <p:sldLayoutId id="2147483650" r:id="rId2"/>
-    <p:sldLayoutId id="2147483651" r:id="rId3"/>
-    <p:sldLayoutId id="2147483652" r:id="rId4"/>
-    <p:sldLayoutId id="2147483653" r:id="rId5"/>
-    <p:sldLayoutId id="2147483654" r:id="rId6"/>
-    <p:sldLayoutId id="2147483655" r:id="rId7"/>
-    <p:sldLayoutId id="2147483656" r:id="rId8"/>
-    <p:sldLayoutId id="2147483657" r:id="rId9"/>
-    <p:sldLayoutId id="2147483658" r:id="rId10"/>
-    <p:sldLayoutId id="2147483659" r:id="rId11"/>
+    <p:sldLayoutId id="2147483661" r:id="rId1"/>
+    <p:sldLayoutId id="2147483662" r:id="rId2"/>
+    <p:sldLayoutId id="2147483663" r:id="rId3"/>
+    <p:sldLayoutId id="2147483664" r:id="rId4"/>
+    <p:sldLayoutId id="2147483665" r:id="rId5"/>
+    <p:sldLayoutId id="2147483666" r:id="rId6"/>
+    <p:sldLayoutId id="2147483667" r:id="rId7"/>
+    <p:sldLayoutId id="2147483668" r:id="rId8"/>
+    <p:sldLayoutId id="2147483669" r:id="rId9"/>
+    <p:sldLayoutId id="2147483670" r:id="rId10"/>
+    <p:sldLayoutId id="2147483671" r:id="rId11"/>
   </p:sldLayoutIdLst>
   <p:txStyles>
     <p:titleStyle>
-      <a:lvl1pPr algn="ctr" defTabSz="457200" rtl="0" eaLnBrk="1" latinLnBrk="0" hangingPunct="1">
+      <a:lvl1pPr algn="l" defTabSz="914400" rtl="0" eaLnBrk="1" latinLnBrk="0" hangingPunct="1">
+        <a:lnSpc>
+          <a:spcPct val="90000"/>
+        </a:lnSpc>
         <a:spcBef>
           <a:spcPct val="0"/>
         </a:spcBef>
@@ -3336,13 +3698,16 @@
       </a:lvl1pPr>
     </p:titleStyle>
     <p:bodyStyle>
-      <a:lvl1pPr marL="342900" indent="-342900" algn="l" defTabSz="457200" rtl="0" eaLnBrk="1" latinLnBrk="0" hangingPunct="1">
+      <a:lvl1pPr marL="228600" indent="-228600" algn="l" defTabSz="914400" rtl="0" eaLnBrk="1" latinLnBrk="0" hangingPunct="1">
+        <a:lnSpc>
+          <a:spcPct val="90000"/>
+        </a:lnSpc>
         <a:spcBef>
-          <a:spcPct val="20000"/>
+          <a:spcPts val="1000"/>
         </a:spcBef>
-        <a:buFont typeface="Arial"/>
+        <a:buFont typeface="Arial" panose="020B0604020202020204" pitchFamily="34" charset="0"/>
         <a:buChar char="•"/>
-        <a:defRPr sz="3200" kern="1200">
+        <a:defRPr sz="2800" kern="1200">
           <a:solidFill>
             <a:schemeClr val="tx1"/>
           </a:solidFill>
@@ -3351,26 +3716,14 @@
           <a:cs typeface="+mn-cs"/>
         </a:defRPr>
       </a:lvl1pPr>
-      <a:lvl2pPr marL="742950" indent="-285750" algn="l" defTabSz="457200" rtl="0" eaLnBrk="1" latinLnBrk="0" hangingPunct="1">
+      <a:lvl2pPr marL="685800" indent="-228600" algn="l" defTabSz="914400" rtl="0" eaLnBrk="1" latinLnBrk="0" hangingPunct="1">
+        <a:lnSpc>
+          <a:spcPct val="90000"/>
+        </a:lnSpc>
         <a:spcBef>
-          <a:spcPct val="20000"/>
+          <a:spcPts val="500"/>
         </a:spcBef>
-        <a:buFont typeface="Arial"/>
-        <a:buChar char="–"/>
-        <a:defRPr sz="2800" kern="1200">
-          <a:solidFill>
-            <a:schemeClr val="tx1"/>
-          </a:solidFill>
-          <a:latin typeface="+mn-lt"/>
-          <a:ea typeface="+mn-ea"/>
-          <a:cs typeface="+mn-cs"/>
-        </a:defRPr>
-      </a:lvl2pPr>
-      <a:lvl3pPr marL="1143000" indent="-228600" algn="l" defTabSz="457200" rtl="0" eaLnBrk="1" latinLnBrk="0" hangingPunct="1">
-        <a:spcBef>
-          <a:spcPct val="20000"/>
-        </a:spcBef>
-        <a:buFont typeface="Arial"/>
+        <a:buFont typeface="Arial" panose="020B0604020202020204" pitchFamily="34" charset="0"/>
         <a:buChar char="•"/>
         <a:defRPr sz="2400" kern="1200">
           <a:solidFill>
@@ -3380,42 +3733,15 @@
           <a:ea typeface="+mn-ea"/>
           <a:cs typeface="+mn-cs"/>
         </a:defRPr>
-      </a:lvl3pPr>
-      <a:lvl4pPr marL="1600200" indent="-228600" algn="l" defTabSz="457200" rtl="0" eaLnBrk="1" latinLnBrk="0" hangingPunct="1">
+      </a:lvl2pPr>
+      <a:lvl3pPr marL="1143000" indent="-228600" algn="l" defTabSz="914400" rtl="0" eaLnBrk="1" latinLnBrk="0" hangingPunct="1">
+        <a:lnSpc>
+          <a:spcPct val="90000"/>
+        </a:lnSpc>
         <a:spcBef>
-          <a:spcPct val="20000"/>
+          <a:spcPts val="500"/>
         </a:spcBef>
-        <a:buFont typeface="Arial"/>
-        <a:buChar char="–"/>
-        <a:defRPr sz="2000" kern="1200">
-          <a:solidFill>
-            <a:schemeClr val="tx1"/>
-          </a:solidFill>
-          <a:latin typeface="+mn-lt"/>
-          <a:ea typeface="+mn-ea"/>
-          <a:cs typeface="+mn-cs"/>
-        </a:defRPr>
-      </a:lvl4pPr>
-      <a:lvl5pPr marL="2057400" indent="-228600" algn="l" defTabSz="457200" rtl="0" eaLnBrk="1" latinLnBrk="0" hangingPunct="1">
-        <a:spcBef>
-          <a:spcPct val="20000"/>
-        </a:spcBef>
-        <a:buFont typeface="Arial"/>
-        <a:buChar char="»"/>
-        <a:defRPr sz="2000" kern="1200">
-          <a:solidFill>
-            <a:schemeClr val="tx1"/>
-          </a:solidFill>
-          <a:latin typeface="+mn-lt"/>
-          <a:ea typeface="+mn-ea"/>
-          <a:cs typeface="+mn-cs"/>
-        </a:defRPr>
-      </a:lvl5pPr>
-      <a:lvl6pPr marL="2514600" indent="-228600" algn="l" defTabSz="457200" rtl="0" eaLnBrk="1" latinLnBrk="0" hangingPunct="1">
-        <a:spcBef>
-          <a:spcPct val="20000"/>
-        </a:spcBef>
-        <a:buFont typeface="Arial"/>
+        <a:buFont typeface="Arial" panose="020B0604020202020204" pitchFamily="34" charset="0"/>
         <a:buChar char="•"/>
         <a:defRPr sz="2000" kern="1200">
           <a:solidFill>
@@ -3425,14 +3751,71 @@
           <a:ea typeface="+mn-ea"/>
           <a:cs typeface="+mn-cs"/>
         </a:defRPr>
+      </a:lvl3pPr>
+      <a:lvl4pPr marL="1600200" indent="-228600" algn="l" defTabSz="914400" rtl="0" eaLnBrk="1" latinLnBrk="0" hangingPunct="1">
+        <a:lnSpc>
+          <a:spcPct val="90000"/>
+        </a:lnSpc>
+        <a:spcBef>
+          <a:spcPts val="500"/>
+        </a:spcBef>
+        <a:buFont typeface="Arial" panose="020B0604020202020204" pitchFamily="34" charset="0"/>
+        <a:buChar char="•"/>
+        <a:defRPr sz="1800" kern="1200">
+          <a:solidFill>
+            <a:schemeClr val="tx1"/>
+          </a:solidFill>
+          <a:latin typeface="+mn-lt"/>
+          <a:ea typeface="+mn-ea"/>
+          <a:cs typeface="+mn-cs"/>
+        </a:defRPr>
+      </a:lvl4pPr>
+      <a:lvl5pPr marL="2057400" indent="-228600" algn="l" defTabSz="914400" rtl="0" eaLnBrk="1" latinLnBrk="0" hangingPunct="1">
+        <a:lnSpc>
+          <a:spcPct val="90000"/>
+        </a:lnSpc>
+        <a:spcBef>
+          <a:spcPts val="500"/>
+        </a:spcBef>
+        <a:buFont typeface="Arial" panose="020B0604020202020204" pitchFamily="34" charset="0"/>
+        <a:buChar char="•"/>
+        <a:defRPr sz="1800" kern="1200">
+          <a:solidFill>
+            <a:schemeClr val="tx1"/>
+          </a:solidFill>
+          <a:latin typeface="+mn-lt"/>
+          <a:ea typeface="+mn-ea"/>
+          <a:cs typeface="+mn-cs"/>
+        </a:defRPr>
+      </a:lvl5pPr>
+      <a:lvl6pPr marL="2514600" indent="-228600" algn="l" defTabSz="914400" rtl="0" eaLnBrk="1" latinLnBrk="0" hangingPunct="1">
+        <a:lnSpc>
+          <a:spcPct val="90000"/>
+        </a:lnSpc>
+        <a:spcBef>
+          <a:spcPts val="500"/>
+        </a:spcBef>
+        <a:buFont typeface="Arial" panose="020B0604020202020204" pitchFamily="34" charset="0"/>
+        <a:buChar char="•"/>
+        <a:defRPr sz="1800" kern="1200">
+          <a:solidFill>
+            <a:schemeClr val="tx1"/>
+          </a:solidFill>
+          <a:latin typeface="+mn-lt"/>
+          <a:ea typeface="+mn-ea"/>
+          <a:cs typeface="+mn-cs"/>
+        </a:defRPr>
       </a:lvl6pPr>
-      <a:lvl7pPr marL="2971800" indent="-228600" algn="l" defTabSz="457200" rtl="0" eaLnBrk="1" latinLnBrk="0" hangingPunct="1">
+      <a:lvl7pPr marL="2971800" indent="-228600" algn="l" defTabSz="914400" rtl="0" eaLnBrk="1" latinLnBrk="0" hangingPunct="1">
+        <a:lnSpc>
+          <a:spcPct val="90000"/>
+        </a:lnSpc>
         <a:spcBef>
-          <a:spcPct val="20000"/>
+          <a:spcPts val="500"/>
         </a:spcBef>
-        <a:buFont typeface="Arial"/>
+        <a:buFont typeface="Arial" panose="020B0604020202020204" pitchFamily="34" charset="0"/>
         <a:buChar char="•"/>
-        <a:defRPr sz="2000" kern="1200">
+        <a:defRPr sz="1800" kern="1200">
           <a:solidFill>
             <a:schemeClr val="tx1"/>
           </a:solidFill>
@@ -3441,13 +3824,16 @@
           <a:cs typeface="+mn-cs"/>
         </a:defRPr>
       </a:lvl7pPr>
-      <a:lvl8pPr marL="3429000" indent="-228600" algn="l" defTabSz="457200" rtl="0" eaLnBrk="1" latinLnBrk="0" hangingPunct="1">
+      <a:lvl8pPr marL="3429000" indent="-228600" algn="l" defTabSz="914400" rtl="0" eaLnBrk="1" latinLnBrk="0" hangingPunct="1">
+        <a:lnSpc>
+          <a:spcPct val="90000"/>
+        </a:lnSpc>
         <a:spcBef>
-          <a:spcPct val="20000"/>
+          <a:spcPts val="500"/>
         </a:spcBef>
-        <a:buFont typeface="Arial"/>
+        <a:buFont typeface="Arial" panose="020B0604020202020204" pitchFamily="34" charset="0"/>
         <a:buChar char="•"/>
-        <a:defRPr sz="2000" kern="1200">
+        <a:defRPr sz="1800" kern="1200">
           <a:solidFill>
             <a:schemeClr val="tx1"/>
           </a:solidFill>
@@ -3456,13 +3842,16 @@
           <a:cs typeface="+mn-cs"/>
         </a:defRPr>
       </a:lvl8pPr>
-      <a:lvl9pPr marL="3886200" indent="-228600" algn="l" defTabSz="457200" rtl="0" eaLnBrk="1" latinLnBrk="0" hangingPunct="1">
+      <a:lvl9pPr marL="3886200" indent="-228600" algn="l" defTabSz="914400" rtl="0" eaLnBrk="1" latinLnBrk="0" hangingPunct="1">
+        <a:lnSpc>
+          <a:spcPct val="90000"/>
+        </a:lnSpc>
         <a:spcBef>
-          <a:spcPct val="20000"/>
+          <a:spcPts val="500"/>
         </a:spcBef>
-        <a:buFont typeface="Arial"/>
+        <a:buFont typeface="Arial" panose="020B0604020202020204" pitchFamily="34" charset="0"/>
         <a:buChar char="•"/>
-        <a:defRPr sz="2000" kern="1200">
+        <a:defRPr sz="1800" kern="1200">
           <a:solidFill>
             <a:schemeClr val="tx1"/>
           </a:solidFill>
@@ -3476,7 +3865,7 @@
       <a:defPPr>
         <a:defRPr lang="en-US"/>
       </a:defPPr>
-      <a:lvl1pPr marL="0" algn="l" defTabSz="457200" rtl="0" eaLnBrk="1" latinLnBrk="0" hangingPunct="1">
+      <a:lvl1pPr marL="0" algn="l" defTabSz="914400" rtl="0" eaLnBrk="1" latinLnBrk="0" hangingPunct="1">
         <a:defRPr sz="1800" kern="1200">
           <a:solidFill>
             <a:schemeClr val="tx1"/>
@@ -3486,7 +3875,7 @@
           <a:cs typeface="+mn-cs"/>
         </a:defRPr>
       </a:lvl1pPr>
-      <a:lvl2pPr marL="457200" algn="l" defTabSz="457200" rtl="0" eaLnBrk="1" latinLnBrk="0" hangingPunct="1">
+      <a:lvl2pPr marL="457200" algn="l" defTabSz="914400" rtl="0" eaLnBrk="1" latinLnBrk="0" hangingPunct="1">
         <a:defRPr sz="1800" kern="1200">
           <a:solidFill>
             <a:schemeClr val="tx1"/>
@@ -3496,7 +3885,7 @@
           <a:cs typeface="+mn-cs"/>
         </a:defRPr>
       </a:lvl2pPr>
-      <a:lvl3pPr marL="914400" algn="l" defTabSz="457200" rtl="0" eaLnBrk="1" latinLnBrk="0" hangingPunct="1">
+      <a:lvl3pPr marL="914400" algn="l" defTabSz="914400" rtl="0" eaLnBrk="1" latinLnBrk="0" hangingPunct="1">
         <a:defRPr sz="1800" kern="1200">
           <a:solidFill>
             <a:schemeClr val="tx1"/>
@@ -3506,7 +3895,7 @@
           <a:cs typeface="+mn-cs"/>
         </a:defRPr>
       </a:lvl3pPr>
-      <a:lvl4pPr marL="1371600" algn="l" defTabSz="457200" rtl="0" eaLnBrk="1" latinLnBrk="0" hangingPunct="1">
+      <a:lvl4pPr marL="1371600" algn="l" defTabSz="914400" rtl="0" eaLnBrk="1" latinLnBrk="0" hangingPunct="1">
         <a:defRPr sz="1800" kern="1200">
           <a:solidFill>
             <a:schemeClr val="tx1"/>
@@ -3516,7 +3905,7 @@
           <a:cs typeface="+mn-cs"/>
         </a:defRPr>
       </a:lvl4pPr>
-      <a:lvl5pPr marL="1828800" algn="l" defTabSz="457200" rtl="0" eaLnBrk="1" latinLnBrk="0" hangingPunct="1">
+      <a:lvl5pPr marL="1828800" algn="l" defTabSz="914400" rtl="0" eaLnBrk="1" latinLnBrk="0" hangingPunct="1">
         <a:defRPr sz="1800" kern="1200">
           <a:solidFill>
             <a:schemeClr val="tx1"/>
@@ -3526,7 +3915,7 @@
           <a:cs typeface="+mn-cs"/>
         </a:defRPr>
       </a:lvl5pPr>
-      <a:lvl6pPr marL="2286000" algn="l" defTabSz="457200" rtl="0" eaLnBrk="1" latinLnBrk="0" hangingPunct="1">
+      <a:lvl6pPr marL="2286000" algn="l" defTabSz="914400" rtl="0" eaLnBrk="1" latinLnBrk="0" hangingPunct="1">
         <a:defRPr sz="1800" kern="1200">
           <a:solidFill>
             <a:schemeClr val="tx1"/>
@@ -3536,7 +3925,7 @@
           <a:cs typeface="+mn-cs"/>
         </a:defRPr>
       </a:lvl6pPr>
-      <a:lvl7pPr marL="2743200" algn="l" defTabSz="457200" rtl="0" eaLnBrk="1" latinLnBrk="0" hangingPunct="1">
+      <a:lvl7pPr marL="2743200" algn="l" defTabSz="914400" rtl="0" eaLnBrk="1" latinLnBrk="0" hangingPunct="1">
         <a:defRPr sz="1800" kern="1200">
           <a:solidFill>
             <a:schemeClr val="tx1"/>
@@ -3546,7 +3935,7 @@
           <a:cs typeface="+mn-cs"/>
         </a:defRPr>
       </a:lvl7pPr>
-      <a:lvl8pPr marL="3200400" algn="l" defTabSz="457200" rtl="0" eaLnBrk="1" latinLnBrk="0" hangingPunct="1">
+      <a:lvl8pPr marL="3200400" algn="l" defTabSz="914400" rtl="0" eaLnBrk="1" latinLnBrk="0" hangingPunct="1">
         <a:defRPr sz="1800" kern="1200">
           <a:solidFill>
             <a:schemeClr val="tx1"/>
@@ -3556,7 +3945,7 @@
           <a:cs typeface="+mn-cs"/>
         </a:defRPr>
       </a:lvl8pPr>
-      <a:lvl9pPr marL="3657600" algn="l" defTabSz="457200" rtl="0" eaLnBrk="1" latinLnBrk="0" hangingPunct="1">
+      <a:lvl9pPr marL="3657600" algn="l" defTabSz="914400" rtl="0" eaLnBrk="1" latinLnBrk="0" hangingPunct="1">
         <a:defRPr sz="1800" kern="1200">
           <a:solidFill>
             <a:schemeClr val="tx1"/>
@@ -3737,6 +4126,14 @@
 <file path=ppt/slides/slide2.xml><?xml version="1.0" encoding="utf-8"?>
 <p:sld xmlns:a="http://schemas.openxmlformats.org/drawingml/2006/main" xmlns:r="http://schemas.openxmlformats.org/officeDocument/2006/relationships" xmlns:p="http://schemas.openxmlformats.org/presentationml/2006/main">
   <p:cSld>
+    <p:bg>
+      <p:bgPr>
+        <a:solidFill>
+          <a:schemeClr val="bg1"/>
+        </a:solidFill>
+        <a:effectLst/>
+      </p:bgPr>
+    </p:bg>
     <p:spTree>
       <p:nvGrpSpPr>
         <p:cNvPr id="1" name=""/>
@@ -3751,6 +4148,309 @@
           <a:chExt cx="0" cy="0"/>
         </a:xfrm>
       </p:grpSpPr>
+      <p:sp useBgFill="1">
+        <p:nvSpPr>
+          <p:cNvPr id="36" name="Rectangle 35">
+            <a:extLst>
+              <a:ext uri="{FF2B5EF4-FFF2-40B4-BE49-F238E27FC236}">
+                <a16:creationId xmlns:a16="http://schemas.microsoft.com/office/drawing/2014/main" id="{A8384FB5-9ADC-4DDC-881B-597D56F5B15D}"/>
+              </a:ext>
+              <a:ext uri="{C183D7F6-B498-43B3-948B-1728B52AA6E4}">
+                <adec:decorative xmlns:adec="http://schemas.microsoft.com/office/drawing/2017/decorative" val="1"/>
+              </a:ext>
+            </a:extLst>
+          </p:cNvPr>
+          <p:cNvSpPr>
+            <a:spLocks noGrp="1" noRot="1" noChangeAspect="1" noMove="1" noResize="1" noEditPoints="1" noAdjustHandles="1" noChangeArrowheads="1" noChangeShapeType="1" noTextEdit="1"/>
+          </p:cNvSpPr>
+          <p:nvPr>
+            <p:extLst>
+              <p:ext uri="{386F3935-93C4-4BCD-93E2-E3B085C9AB24}">
+                <p16:designElem xmlns:p16="http://schemas.microsoft.com/office/powerpoint/2015/main" val="1"/>
+              </p:ext>
+            </p:extLst>
+          </p:nvPr>
+        </p:nvSpPr>
+        <p:spPr>
+          <a:xfrm>
+            <a:off x="0" y="0"/>
+            <a:ext cx="12192000" cy="6858000"/>
+          </a:xfrm>
+          <a:prstGeom prst="rect">
+            <a:avLst/>
+          </a:prstGeom>
+          <a:ln w="12700" cap="flat" cmpd="sng" algn="ctr">
+            <a:noFill/>
+            <a:prstDash val="solid"/>
+            <a:miter lim="800000"/>
+          </a:ln>
+          <a:effectLst/>
+          <a:extLst>
+            <a:ext uri="{91240B29-F687-4F45-9708-019B960494DF}">
+              <a14:hiddenLine xmlns:a14="http://schemas.microsoft.com/office/drawing/2010/main" w="12700" cap="flat" cmpd="sng" algn="ctr">
+                <a:solidFill>
+                  <a:schemeClr val="accent1">
+                    <a:shade val="50000"/>
+                  </a:schemeClr>
+                </a:solidFill>
+                <a:prstDash val="solid"/>
+                <a:miter lim="800000"/>
+              </a14:hiddenLine>
+            </a:ext>
+          </a:extLst>
+        </p:spPr>
+        <p:style>
+          <a:lnRef idx="2">
+            <a:schemeClr val="accent1">
+              <a:shade val="50000"/>
+            </a:schemeClr>
+          </a:lnRef>
+          <a:fillRef idx="1">
+            <a:schemeClr val="accent1"/>
+          </a:fillRef>
+          <a:effectRef idx="0">
+            <a:schemeClr val="accent1"/>
+          </a:effectRef>
+          <a:fontRef idx="minor">
+            <a:schemeClr val="lt1"/>
+          </a:fontRef>
+        </p:style>
+        <p:txBody>
+          <a:bodyPr rtlCol="0" anchor="ctr"/>
+          <a:lstStyle/>
+          <a:p>
+            <a:pPr algn="ctr"/>
+            <a:endParaRPr lang="en-US"/>
+          </a:p>
+        </p:txBody>
+      </p:sp>
+      <p:sp>
+        <p:nvSpPr>
+          <p:cNvPr id="38" name="Rectangle 37">
+            <a:extLst>
+              <a:ext uri="{FF2B5EF4-FFF2-40B4-BE49-F238E27FC236}">
+                <a16:creationId xmlns:a16="http://schemas.microsoft.com/office/drawing/2014/main" id="{1199E1B1-A8C0-4FE8-A5A8-1CB41D69F857}"/>
+              </a:ext>
+              <a:ext uri="{C183D7F6-B498-43B3-948B-1728B52AA6E4}">
+                <adec:decorative xmlns:adec="http://schemas.microsoft.com/office/drawing/2017/decorative" val="1"/>
+              </a:ext>
+            </a:extLst>
+          </p:cNvPr>
+          <p:cNvSpPr>
+            <a:spLocks noGrp="1" noRot="1" noChangeAspect="1" noMove="1" noResize="1" noEditPoints="1" noAdjustHandles="1" noChangeArrowheads="1" noChangeShapeType="1" noTextEdit="1"/>
+          </p:cNvSpPr>
+          <p:nvPr>
+            <p:extLst>
+              <p:ext uri="{386F3935-93C4-4BCD-93E2-E3B085C9AB24}">
+                <p16:designElem xmlns:p16="http://schemas.microsoft.com/office/powerpoint/2015/main" val="1"/>
+              </p:ext>
+            </p:extLst>
+          </p:nvPr>
+        </p:nvSpPr>
+        <p:spPr>
+          <a:xfrm rot="10800000" flipH="1">
+            <a:off x="2" y="0"/>
+            <a:ext cx="12191998" cy="1575955"/>
+          </a:xfrm>
+          <a:prstGeom prst="rect">
+            <a:avLst/>
+          </a:prstGeom>
+          <a:gradFill>
+            <a:gsLst>
+              <a:gs pos="0">
+                <a:srgbClr val="000000">
+                  <a:alpha val="96000"/>
+                </a:srgbClr>
+              </a:gs>
+              <a:gs pos="100000">
+                <a:schemeClr val="accent1">
+                  <a:lumMod val="75000"/>
+                </a:schemeClr>
+              </a:gs>
+            </a:gsLst>
+            <a:lin ang="6000000" scaled="0"/>
+          </a:gradFill>
+          <a:ln>
+            <a:noFill/>
+          </a:ln>
+        </p:spPr>
+        <p:style>
+          <a:lnRef idx="2">
+            <a:schemeClr val="accent1">
+              <a:shade val="50000"/>
+            </a:schemeClr>
+          </a:lnRef>
+          <a:fillRef idx="1">
+            <a:schemeClr val="accent1"/>
+          </a:fillRef>
+          <a:effectRef idx="0">
+            <a:schemeClr val="accent1"/>
+          </a:effectRef>
+          <a:fontRef idx="minor">
+            <a:schemeClr val="lt1"/>
+          </a:fontRef>
+        </p:style>
+        <p:txBody>
+          <a:bodyPr rtlCol="0" anchor="ctr"/>
+          <a:lstStyle/>
+          <a:p>
+            <a:pPr algn="ctr"/>
+            <a:endParaRPr lang="en-US"/>
+          </a:p>
+        </p:txBody>
+      </p:sp>
+      <p:sp>
+        <p:nvSpPr>
+          <p:cNvPr id="40" name="Rectangle 39">
+            <a:extLst>
+              <a:ext uri="{FF2B5EF4-FFF2-40B4-BE49-F238E27FC236}">
+                <a16:creationId xmlns:a16="http://schemas.microsoft.com/office/drawing/2014/main" id="{84A8DE83-DE75-4B41-9DB4-A7EC0B0DEC0B}"/>
+              </a:ext>
+              <a:ext uri="{C183D7F6-B498-43B3-948B-1728B52AA6E4}">
+                <adec:decorative xmlns:adec="http://schemas.microsoft.com/office/drawing/2017/decorative" val="1"/>
+              </a:ext>
+            </a:extLst>
+          </p:cNvPr>
+          <p:cNvSpPr>
+            <a:spLocks noGrp="1" noRot="1" noChangeAspect="1" noMove="1" noResize="1" noEditPoints="1" noAdjustHandles="1" noChangeArrowheads="1" noChangeShapeType="1" noTextEdit="1"/>
+          </p:cNvSpPr>
+          <p:nvPr>
+            <p:extLst>
+              <p:ext uri="{386F3935-93C4-4BCD-93E2-E3B085C9AB24}">
+                <p16:designElem xmlns:p16="http://schemas.microsoft.com/office/powerpoint/2015/main" val="1"/>
+              </p:ext>
+            </p:extLst>
+          </p:nvPr>
+        </p:nvSpPr>
+        <p:spPr>
+          <a:xfrm>
+            <a:off x="0" y="0"/>
+            <a:ext cx="8128856" cy="1575461"/>
+          </a:xfrm>
+          <a:prstGeom prst="rect">
+            <a:avLst/>
+          </a:prstGeom>
+          <a:gradFill>
+            <a:gsLst>
+              <a:gs pos="0">
+                <a:schemeClr val="accent1">
+                  <a:alpha val="41000"/>
+                </a:schemeClr>
+              </a:gs>
+              <a:gs pos="74000">
+                <a:schemeClr val="accent1">
+                  <a:lumMod val="60000"/>
+                  <a:lumOff val="40000"/>
+                  <a:alpha val="0"/>
+                </a:schemeClr>
+              </a:gs>
+            </a:gsLst>
+            <a:lin ang="8400000" scaled="0"/>
+          </a:gradFill>
+          <a:ln>
+            <a:noFill/>
+          </a:ln>
+        </p:spPr>
+        <p:style>
+          <a:lnRef idx="2">
+            <a:schemeClr val="accent1">
+              <a:shade val="50000"/>
+            </a:schemeClr>
+          </a:lnRef>
+          <a:fillRef idx="1">
+            <a:schemeClr val="accent1"/>
+          </a:fillRef>
+          <a:effectRef idx="0">
+            <a:schemeClr val="accent1"/>
+          </a:effectRef>
+          <a:fontRef idx="minor">
+            <a:schemeClr val="lt1"/>
+          </a:fontRef>
+        </p:style>
+        <p:txBody>
+          <a:bodyPr rtlCol="0" anchor="ctr"/>
+          <a:lstStyle/>
+          <a:p>
+            <a:pPr algn="ctr"/>
+            <a:endParaRPr lang="en-US"/>
+          </a:p>
+        </p:txBody>
+      </p:sp>
+      <p:sp>
+        <p:nvSpPr>
+          <p:cNvPr id="42" name="Rectangle 41">
+            <a:extLst>
+              <a:ext uri="{FF2B5EF4-FFF2-40B4-BE49-F238E27FC236}">
+                <a16:creationId xmlns:a16="http://schemas.microsoft.com/office/drawing/2014/main" id="{A7009A0A-BEF5-4EAC-AF15-E4F9F002E239}"/>
+              </a:ext>
+              <a:ext uri="{C183D7F6-B498-43B3-948B-1728B52AA6E4}">
+                <adec:decorative xmlns:adec="http://schemas.microsoft.com/office/drawing/2017/decorative" val="1"/>
+              </a:ext>
+            </a:extLst>
+          </p:cNvPr>
+          <p:cNvSpPr>
+            <a:spLocks noGrp="1" noRot="1" noChangeAspect="1" noMove="1" noResize="1" noEditPoints="1" noAdjustHandles="1" noChangeArrowheads="1" noChangeShapeType="1" noTextEdit="1"/>
+          </p:cNvSpPr>
+          <p:nvPr>
+            <p:extLst>
+              <p:ext uri="{386F3935-93C4-4BCD-93E2-E3B085C9AB24}">
+                <p16:designElem xmlns:p16="http://schemas.microsoft.com/office/powerpoint/2015/main" val="1"/>
+              </p:ext>
+            </p:extLst>
+          </p:nvPr>
+        </p:nvSpPr>
+        <p:spPr>
+          <a:xfrm flipH="1">
+            <a:off x="-3" y="-1"/>
+            <a:ext cx="12192002" cy="1574311"/>
+          </a:xfrm>
+          <a:prstGeom prst="rect">
+            <a:avLst/>
+          </a:prstGeom>
+          <a:gradFill>
+            <a:gsLst>
+              <a:gs pos="0">
+                <a:srgbClr val="000000">
+                  <a:alpha val="63000"/>
+                </a:srgbClr>
+              </a:gs>
+              <a:gs pos="78000">
+                <a:schemeClr val="accent1">
+                  <a:alpha val="15000"/>
+                </a:schemeClr>
+              </a:gs>
+            </a:gsLst>
+            <a:lin ang="15600000" scaled="0"/>
+          </a:gradFill>
+          <a:ln>
+            <a:noFill/>
+          </a:ln>
+        </p:spPr>
+        <p:style>
+          <a:lnRef idx="2">
+            <a:schemeClr val="accent1">
+              <a:shade val="50000"/>
+            </a:schemeClr>
+          </a:lnRef>
+          <a:fillRef idx="1">
+            <a:schemeClr val="accent1"/>
+          </a:fillRef>
+          <a:effectRef idx="0">
+            <a:schemeClr val="accent1"/>
+          </a:effectRef>
+          <a:fontRef idx="minor">
+            <a:schemeClr val="lt1"/>
+          </a:fontRef>
+        </p:style>
+        <p:txBody>
+          <a:bodyPr rtlCol="0" anchor="ctr"/>
+          <a:lstStyle/>
+          <a:p>
+            <a:pPr algn="ctr"/>
+            <a:endParaRPr lang="en-US"/>
+          </a:p>
+        </p:txBody>
+      </p:sp>
       <p:sp>
         <p:nvSpPr>
           <p:cNvPr id="2" name="Title 1"/>
@@ -3761,18 +4461,62 @@
             <p:ph type="title"/>
           </p:nvPr>
         </p:nvSpPr>
-        <p:spPr/>
-        <p:txBody>
-          <a:bodyPr/>
-          <a:lstStyle/>
-          <a:p>
-            <a:r>
-              <a:rPr dirty="0"/>
+        <p:spPr>
+          <a:xfrm>
+            <a:off x="699713" y="248038"/>
+            <a:ext cx="7063721" cy="1159200"/>
+          </a:xfrm>
+        </p:spPr>
+        <p:txBody>
+          <a:bodyPr vert="horz" lIns="91440" tIns="45720" rIns="91440" bIns="45720" rtlCol="0" anchor="ctr">
+            <a:normAutofit/>
+          </a:bodyPr>
+          <a:lstStyle/>
+          <a:p>
+            <a:r>
+              <a:rPr lang="en-US" sz="4000" kern="1200" dirty="0">
+                <a:solidFill>
+                  <a:srgbClr val="FFFFFF"/>
+                </a:solidFill>
+                <a:latin typeface="+mj-lt"/>
+                <a:ea typeface="+mj-ea"/>
+                <a:cs typeface="+mj-cs"/>
+              </a:rPr>
               <a:t>GUI Design</a:t>
             </a:r>
           </a:p>
         </p:txBody>
       </p:sp>
+      <p:pic>
+        <p:nvPicPr>
+          <p:cNvPr id="4" name="Picture 3" descr="A screenshot of a computer&#10;&#10;AI-generated content may be incorrect.">
+            <a:extLst>
+              <a:ext uri="{FF2B5EF4-FFF2-40B4-BE49-F238E27FC236}">
+                <a16:creationId xmlns:a16="http://schemas.microsoft.com/office/drawing/2014/main" id="{38AB8DCA-8854-BD1C-394E-DC914824D6EB}"/>
+              </a:ext>
+            </a:extLst>
+          </p:cNvPr>
+          <p:cNvPicPr>
+            <a:picLocks noChangeAspect="1"/>
+          </p:cNvPicPr>
+          <p:nvPr/>
+        </p:nvPicPr>
+        <p:blipFill>
+          <a:blip r:embed="rId3"/>
+          <a:stretch>
+            <a:fillRect/>
+          </a:stretch>
+        </p:blipFill>
+        <p:spPr>
+          <a:xfrm>
+            <a:off x="1835559" y="1966293"/>
+            <a:ext cx="8520880" cy="4452160"/>
+          </a:xfrm>
+          <a:prstGeom prst="rect">
+            <a:avLst/>
+          </a:prstGeom>
+        </p:spPr>
+      </p:pic>
     </p:spTree>
   </p:cSld>
   <p:clrMapOvr>
@@ -3784,9 +4528,23 @@
 <file path=ppt/slides/slide3.xml><?xml version="1.0" encoding="utf-8"?>
 <p:sld xmlns:a="http://schemas.openxmlformats.org/drawingml/2006/main" xmlns:r="http://schemas.openxmlformats.org/officeDocument/2006/relationships" xmlns:p="http://schemas.openxmlformats.org/presentationml/2006/main">
   <p:cSld>
+    <p:bg>
+      <p:bgPr>
+        <a:solidFill>
+          <a:schemeClr val="bg1"/>
+        </a:solidFill>
+        <a:effectLst/>
+      </p:bgPr>
+    </p:bg>
     <p:spTree>
       <p:nvGrpSpPr>
-        <p:cNvPr id="1" name=""/>
+        <p:cNvPr id="1" name="">
+          <a:extLst>
+            <a:ext uri="{FF2B5EF4-FFF2-40B4-BE49-F238E27FC236}">
+              <a16:creationId xmlns:a16="http://schemas.microsoft.com/office/drawing/2014/main" id="{835F9F54-BC2C-126B-3F18-E29A7CEE72AD}"/>
+            </a:ext>
+          </a:extLst>
+        </p:cNvPr>
         <p:cNvGrpSpPr/>
         <p:nvPr/>
       </p:nvGrpSpPr>
@@ -3798,9 +4556,318 @@
           <a:chExt cx="0" cy="0"/>
         </a:xfrm>
       </p:grpSpPr>
-      <p:sp>
-        <p:nvSpPr>
-          <p:cNvPr id="2" name="Title 1"/>
+      <p:sp useBgFill="1">
+        <p:nvSpPr>
+          <p:cNvPr id="36" name="Rectangle 35">
+            <a:extLst>
+              <a:ext uri="{FF2B5EF4-FFF2-40B4-BE49-F238E27FC236}">
+                <a16:creationId xmlns:a16="http://schemas.microsoft.com/office/drawing/2014/main" id="{BCF8FCD3-0B7B-EF50-E995-70CD19B2B4EC}"/>
+              </a:ext>
+              <a:ext uri="{C183D7F6-B498-43B3-948B-1728B52AA6E4}">
+                <adec:decorative xmlns:adec="http://schemas.microsoft.com/office/drawing/2017/decorative" val="1"/>
+              </a:ext>
+            </a:extLst>
+          </p:cNvPr>
+          <p:cNvSpPr>
+            <a:spLocks noGrp="1" noRot="1" noChangeAspect="1" noMove="1" noResize="1" noEditPoints="1" noAdjustHandles="1" noChangeArrowheads="1" noChangeShapeType="1" noTextEdit="1"/>
+          </p:cNvSpPr>
+          <p:nvPr>
+            <p:extLst>
+              <p:ext uri="{386F3935-93C4-4BCD-93E2-E3B085C9AB24}">
+                <p16:designElem xmlns:p16="http://schemas.microsoft.com/office/powerpoint/2015/main" val="1"/>
+              </p:ext>
+            </p:extLst>
+          </p:nvPr>
+        </p:nvSpPr>
+        <p:spPr>
+          <a:xfrm>
+            <a:off x="0" y="0"/>
+            <a:ext cx="12192000" cy="6858000"/>
+          </a:xfrm>
+          <a:prstGeom prst="rect">
+            <a:avLst/>
+          </a:prstGeom>
+          <a:ln w="12700" cap="flat" cmpd="sng" algn="ctr">
+            <a:noFill/>
+            <a:prstDash val="solid"/>
+            <a:miter lim="800000"/>
+          </a:ln>
+          <a:effectLst/>
+          <a:extLst>
+            <a:ext uri="{91240B29-F687-4F45-9708-019B960494DF}">
+              <a14:hiddenLine xmlns:a14="http://schemas.microsoft.com/office/drawing/2010/main" w="12700" cap="flat" cmpd="sng" algn="ctr">
+                <a:solidFill>
+                  <a:schemeClr val="accent1">
+                    <a:shade val="50000"/>
+                  </a:schemeClr>
+                </a:solidFill>
+                <a:prstDash val="solid"/>
+                <a:miter lim="800000"/>
+              </a14:hiddenLine>
+            </a:ext>
+          </a:extLst>
+        </p:spPr>
+        <p:style>
+          <a:lnRef idx="2">
+            <a:schemeClr val="accent1">
+              <a:shade val="50000"/>
+            </a:schemeClr>
+          </a:lnRef>
+          <a:fillRef idx="1">
+            <a:schemeClr val="accent1"/>
+          </a:fillRef>
+          <a:effectRef idx="0">
+            <a:schemeClr val="accent1"/>
+          </a:effectRef>
+          <a:fontRef idx="minor">
+            <a:schemeClr val="lt1"/>
+          </a:fontRef>
+        </p:style>
+        <p:txBody>
+          <a:bodyPr rtlCol="0" anchor="ctr"/>
+          <a:lstStyle/>
+          <a:p>
+            <a:pPr algn="ctr"/>
+            <a:endParaRPr lang="en-US"/>
+          </a:p>
+        </p:txBody>
+      </p:sp>
+      <p:sp>
+        <p:nvSpPr>
+          <p:cNvPr id="38" name="Rectangle 37">
+            <a:extLst>
+              <a:ext uri="{FF2B5EF4-FFF2-40B4-BE49-F238E27FC236}">
+                <a16:creationId xmlns:a16="http://schemas.microsoft.com/office/drawing/2014/main" id="{93CB7A04-5CF2-04AF-6BE2-A04A1B6F67E7}"/>
+              </a:ext>
+              <a:ext uri="{C183D7F6-B498-43B3-948B-1728B52AA6E4}">
+                <adec:decorative xmlns:adec="http://schemas.microsoft.com/office/drawing/2017/decorative" val="1"/>
+              </a:ext>
+            </a:extLst>
+          </p:cNvPr>
+          <p:cNvSpPr>
+            <a:spLocks noGrp="1" noRot="1" noChangeAspect="1" noMove="1" noResize="1" noEditPoints="1" noAdjustHandles="1" noChangeArrowheads="1" noChangeShapeType="1" noTextEdit="1"/>
+          </p:cNvSpPr>
+          <p:nvPr>
+            <p:extLst>
+              <p:ext uri="{386F3935-93C4-4BCD-93E2-E3B085C9AB24}">
+                <p16:designElem xmlns:p16="http://schemas.microsoft.com/office/powerpoint/2015/main" val="1"/>
+              </p:ext>
+            </p:extLst>
+          </p:nvPr>
+        </p:nvSpPr>
+        <p:spPr>
+          <a:xfrm rot="10800000" flipH="1">
+            <a:off x="2" y="0"/>
+            <a:ext cx="12191998" cy="1575955"/>
+          </a:xfrm>
+          <a:prstGeom prst="rect">
+            <a:avLst/>
+          </a:prstGeom>
+          <a:gradFill>
+            <a:gsLst>
+              <a:gs pos="0">
+                <a:srgbClr val="000000">
+                  <a:alpha val="96000"/>
+                </a:srgbClr>
+              </a:gs>
+              <a:gs pos="100000">
+                <a:schemeClr val="accent1">
+                  <a:lumMod val="75000"/>
+                </a:schemeClr>
+              </a:gs>
+            </a:gsLst>
+            <a:lin ang="6000000" scaled="0"/>
+          </a:gradFill>
+          <a:ln>
+            <a:noFill/>
+          </a:ln>
+        </p:spPr>
+        <p:style>
+          <a:lnRef idx="2">
+            <a:schemeClr val="accent1">
+              <a:shade val="50000"/>
+            </a:schemeClr>
+          </a:lnRef>
+          <a:fillRef idx="1">
+            <a:schemeClr val="accent1"/>
+          </a:fillRef>
+          <a:effectRef idx="0">
+            <a:schemeClr val="accent1"/>
+          </a:effectRef>
+          <a:fontRef idx="minor">
+            <a:schemeClr val="lt1"/>
+          </a:fontRef>
+        </p:style>
+        <p:txBody>
+          <a:bodyPr rtlCol="0" anchor="ctr"/>
+          <a:lstStyle/>
+          <a:p>
+            <a:pPr algn="ctr"/>
+            <a:endParaRPr lang="en-US"/>
+          </a:p>
+        </p:txBody>
+      </p:sp>
+      <p:sp>
+        <p:nvSpPr>
+          <p:cNvPr id="40" name="Rectangle 39">
+            <a:extLst>
+              <a:ext uri="{FF2B5EF4-FFF2-40B4-BE49-F238E27FC236}">
+                <a16:creationId xmlns:a16="http://schemas.microsoft.com/office/drawing/2014/main" id="{D3E56373-4884-3336-630D-6D7632EF7E00}"/>
+              </a:ext>
+              <a:ext uri="{C183D7F6-B498-43B3-948B-1728B52AA6E4}">
+                <adec:decorative xmlns:adec="http://schemas.microsoft.com/office/drawing/2017/decorative" val="1"/>
+              </a:ext>
+            </a:extLst>
+          </p:cNvPr>
+          <p:cNvSpPr>
+            <a:spLocks noGrp="1" noRot="1" noChangeAspect="1" noMove="1" noResize="1" noEditPoints="1" noAdjustHandles="1" noChangeArrowheads="1" noChangeShapeType="1" noTextEdit="1"/>
+          </p:cNvSpPr>
+          <p:nvPr>
+            <p:extLst>
+              <p:ext uri="{386F3935-93C4-4BCD-93E2-E3B085C9AB24}">
+                <p16:designElem xmlns:p16="http://schemas.microsoft.com/office/powerpoint/2015/main" val="1"/>
+              </p:ext>
+            </p:extLst>
+          </p:nvPr>
+        </p:nvSpPr>
+        <p:spPr>
+          <a:xfrm>
+            <a:off x="0" y="0"/>
+            <a:ext cx="8128856" cy="1575461"/>
+          </a:xfrm>
+          <a:prstGeom prst="rect">
+            <a:avLst/>
+          </a:prstGeom>
+          <a:gradFill>
+            <a:gsLst>
+              <a:gs pos="0">
+                <a:schemeClr val="accent1">
+                  <a:alpha val="41000"/>
+                </a:schemeClr>
+              </a:gs>
+              <a:gs pos="74000">
+                <a:schemeClr val="accent1">
+                  <a:lumMod val="60000"/>
+                  <a:lumOff val="40000"/>
+                  <a:alpha val="0"/>
+                </a:schemeClr>
+              </a:gs>
+            </a:gsLst>
+            <a:lin ang="8400000" scaled="0"/>
+          </a:gradFill>
+          <a:ln>
+            <a:noFill/>
+          </a:ln>
+        </p:spPr>
+        <p:style>
+          <a:lnRef idx="2">
+            <a:schemeClr val="accent1">
+              <a:shade val="50000"/>
+            </a:schemeClr>
+          </a:lnRef>
+          <a:fillRef idx="1">
+            <a:schemeClr val="accent1"/>
+          </a:fillRef>
+          <a:effectRef idx="0">
+            <a:schemeClr val="accent1"/>
+          </a:effectRef>
+          <a:fontRef idx="minor">
+            <a:schemeClr val="lt1"/>
+          </a:fontRef>
+        </p:style>
+        <p:txBody>
+          <a:bodyPr rtlCol="0" anchor="ctr"/>
+          <a:lstStyle/>
+          <a:p>
+            <a:pPr algn="ctr"/>
+            <a:endParaRPr lang="en-US"/>
+          </a:p>
+        </p:txBody>
+      </p:sp>
+      <p:sp>
+        <p:nvSpPr>
+          <p:cNvPr id="42" name="Rectangle 41">
+            <a:extLst>
+              <a:ext uri="{FF2B5EF4-FFF2-40B4-BE49-F238E27FC236}">
+                <a16:creationId xmlns:a16="http://schemas.microsoft.com/office/drawing/2014/main" id="{7BC7FEA1-548E-BCCA-4B42-B6BA2C75123D}"/>
+              </a:ext>
+              <a:ext uri="{C183D7F6-B498-43B3-948B-1728B52AA6E4}">
+                <adec:decorative xmlns:adec="http://schemas.microsoft.com/office/drawing/2017/decorative" val="1"/>
+              </a:ext>
+            </a:extLst>
+          </p:cNvPr>
+          <p:cNvSpPr>
+            <a:spLocks noGrp="1" noRot="1" noChangeAspect="1" noMove="1" noResize="1" noEditPoints="1" noAdjustHandles="1" noChangeArrowheads="1" noChangeShapeType="1" noTextEdit="1"/>
+          </p:cNvSpPr>
+          <p:nvPr>
+            <p:extLst>
+              <p:ext uri="{386F3935-93C4-4BCD-93E2-E3B085C9AB24}">
+                <p16:designElem xmlns:p16="http://schemas.microsoft.com/office/powerpoint/2015/main" val="1"/>
+              </p:ext>
+            </p:extLst>
+          </p:nvPr>
+        </p:nvSpPr>
+        <p:spPr>
+          <a:xfrm flipH="1">
+            <a:off x="-3" y="-1"/>
+            <a:ext cx="12192002" cy="1574311"/>
+          </a:xfrm>
+          <a:prstGeom prst="rect">
+            <a:avLst/>
+          </a:prstGeom>
+          <a:gradFill>
+            <a:gsLst>
+              <a:gs pos="0">
+                <a:srgbClr val="000000">
+                  <a:alpha val="63000"/>
+                </a:srgbClr>
+              </a:gs>
+              <a:gs pos="78000">
+                <a:schemeClr val="accent1">
+                  <a:alpha val="15000"/>
+                </a:schemeClr>
+              </a:gs>
+            </a:gsLst>
+            <a:lin ang="15600000" scaled="0"/>
+          </a:gradFill>
+          <a:ln>
+            <a:noFill/>
+          </a:ln>
+        </p:spPr>
+        <p:style>
+          <a:lnRef idx="2">
+            <a:schemeClr val="accent1">
+              <a:shade val="50000"/>
+            </a:schemeClr>
+          </a:lnRef>
+          <a:fillRef idx="1">
+            <a:schemeClr val="accent1"/>
+          </a:fillRef>
+          <a:effectRef idx="0">
+            <a:schemeClr val="accent1"/>
+          </a:effectRef>
+          <a:fontRef idx="minor">
+            <a:schemeClr val="lt1"/>
+          </a:fontRef>
+        </p:style>
+        <p:txBody>
+          <a:bodyPr rtlCol="0" anchor="ctr"/>
+          <a:lstStyle/>
+          <a:p>
+            <a:pPr algn="ctr"/>
+            <a:endParaRPr lang="en-US"/>
+          </a:p>
+        </p:txBody>
+      </p:sp>
+      <p:sp>
+        <p:nvSpPr>
+          <p:cNvPr id="2" name="Title 1">
+            <a:extLst>
+              <a:ext uri="{FF2B5EF4-FFF2-40B4-BE49-F238E27FC236}">
+                <a16:creationId xmlns:a16="http://schemas.microsoft.com/office/drawing/2014/main" id="{80986819-D3D4-049D-D3B4-C21535BA7592}"/>
+              </a:ext>
+            </a:extLst>
+          </p:cNvPr>
           <p:cNvSpPr>
             <a:spLocks noGrp="1"/>
           </p:cNvSpPr>
@@ -3808,20 +4875,46 @@
             <p:ph type="title"/>
           </p:nvPr>
         </p:nvSpPr>
-        <p:spPr/>
-        <p:txBody>
-          <a:bodyPr/>
-          <a:lstStyle/>
-          <a:p>
-            <a:r>
+        <p:spPr>
+          <a:xfrm>
+            <a:off x="699713" y="248038"/>
+            <a:ext cx="7063721" cy="1159200"/>
+          </a:xfrm>
+        </p:spPr>
+        <p:txBody>
+          <a:bodyPr vert="horz" lIns="91440" tIns="45720" rIns="91440" bIns="45720" rtlCol="0" anchor="ctr">
+            <a:normAutofit/>
+          </a:bodyPr>
+          <a:lstStyle/>
+          <a:p>
+            <a:r>
+              <a:rPr lang="en-US" sz="4000" dirty="0">
+                <a:solidFill>
+                  <a:srgbClr val="FFFFFF"/>
+                </a:solidFill>
+              </a:rPr>
               <a:t>Data Collection</a:t>
             </a:r>
-          </a:p>
-        </p:txBody>
-      </p:sp>
-      <p:sp>
-        <p:nvSpPr>
-          <p:cNvPr id="3" name="Content Placeholder 2"/>
+            <a:endParaRPr lang="en-US" sz="4000" kern="1200" dirty="0">
+              <a:solidFill>
+                <a:srgbClr val="FFFFFF"/>
+              </a:solidFill>
+              <a:latin typeface="+mj-lt"/>
+              <a:ea typeface="+mj-ea"/>
+              <a:cs typeface="+mj-cs"/>
+            </a:endParaRPr>
+          </a:p>
+        </p:txBody>
+      </p:sp>
+      <p:sp>
+        <p:nvSpPr>
+          <p:cNvPr id="3" name="Content Placeholder 2">
+            <a:extLst>
+              <a:ext uri="{FF2B5EF4-FFF2-40B4-BE49-F238E27FC236}">
+                <a16:creationId xmlns:a16="http://schemas.microsoft.com/office/drawing/2014/main" id="{69D2DEE1-6FC7-0ACA-0204-591D5511C76E}"/>
+              </a:ext>
+            </a:extLst>
+          </p:cNvPr>
           <p:cNvSpPr>
             <a:spLocks noGrp="1"/>
           </p:cNvSpPr>
@@ -3829,33 +4922,49 @@
             <p:ph idx="1"/>
           </p:nvPr>
         </p:nvSpPr>
-        <p:spPr/>
-        <p:txBody>
-          <a:bodyPr/>
-          <a:lstStyle/>
-          <a:p>
-            <a:r>
+        <p:spPr>
+          <a:xfrm>
+            <a:off x="1371599" y="2318197"/>
+            <a:ext cx="9724031" cy="3683358"/>
+          </a:xfrm>
+        </p:spPr>
+        <p:txBody>
+          <a:bodyPr anchor="ctr">
+            <a:normAutofit/>
+          </a:bodyPr>
+          <a:lstStyle/>
+          <a:p>
+            <a:r>
+              <a:rPr lang="en-US" sz="2000" dirty="0"/>
               <a:t>Types of data: Asset prices, economic indicators, news sentiment.</a:t>
             </a:r>
           </a:p>
           <a:p>
             <a:r>
+              <a:rPr lang="en-US" sz="2000" dirty="0"/>
               <a:t>Time period: Last 5 years; Frequency: Daily and intraday.</a:t>
             </a:r>
           </a:p>
           <a:p>
             <a:r>
+              <a:rPr lang="en-US" sz="2000" dirty="0"/>
               <a:t>Data sources: APIs (Yahoo Finance, Alpha Vantage), news feeds.</a:t>
             </a:r>
           </a:p>
           <a:p>
             <a:r>
+              <a:rPr lang="en-US" sz="2000" dirty="0"/>
               <a:t>Time allocation: 30 seconds.</a:t>
             </a:r>
           </a:p>
         </p:txBody>
       </p:sp>
     </p:spTree>
+    <p:extLst>
+      <p:ext uri="{BB962C8B-B14F-4D97-AF65-F5344CB8AC3E}">
+        <p14:creationId xmlns:p14="http://schemas.microsoft.com/office/powerpoint/2010/main" val="2346582035"/>
+      </p:ext>
+    </p:extLst>
   </p:cSld>
   <p:clrMapOvr>
     <a:masterClrMapping/>
@@ -4366,44 +5475,44 @@
         <a:sysClr val="window" lastClr="FFFFFF"/>
       </a:lt1>
       <a:dk2>
-        <a:srgbClr val="1F497D"/>
+        <a:srgbClr val="0E2841"/>
       </a:dk2>
       <a:lt2>
-        <a:srgbClr val="EEECE1"/>
+        <a:srgbClr val="E8E8E8"/>
       </a:lt2>
       <a:accent1>
-        <a:srgbClr val="4F81BD"/>
+        <a:srgbClr val="156082"/>
       </a:accent1>
       <a:accent2>
-        <a:srgbClr val="C0504D"/>
+        <a:srgbClr val="E97132"/>
       </a:accent2>
       <a:accent3>
-        <a:srgbClr val="9BBB59"/>
+        <a:srgbClr val="196B24"/>
       </a:accent3>
       <a:accent4>
-        <a:srgbClr val="8064A2"/>
+        <a:srgbClr val="0F9ED5"/>
       </a:accent4>
       <a:accent5>
-        <a:srgbClr val="4BACC6"/>
+        <a:srgbClr val="A02B93"/>
       </a:accent5>
       <a:accent6>
-        <a:srgbClr val="F79646"/>
+        <a:srgbClr val="4EA72E"/>
       </a:accent6>
       <a:hlink>
-        <a:srgbClr val="0000FF"/>
+        <a:srgbClr val="467886"/>
       </a:hlink>
       <a:folHlink>
-        <a:srgbClr val="800080"/>
+        <a:srgbClr val="96607D"/>
       </a:folHlink>
     </a:clrScheme>
     <a:fontScheme name="Office">
       <a:majorFont>
-        <a:latin typeface="Calibri"/>
+        <a:latin typeface="Aptos Display" panose="02110004020202020204"/>
         <a:ea typeface=""/>
         <a:cs typeface=""/>
-        <a:font script="Jpan" typeface="ＭＳ Ｐゴシック"/>
+        <a:font script="Jpan" typeface="游ゴシック Light"/>
         <a:font script="Hang" typeface="맑은 고딕"/>
-        <a:font script="Hans" typeface="宋体"/>
+        <a:font script="Hans" typeface="等线 Light"/>
         <a:font script="Hant" typeface="新細明體"/>
         <a:font script="Arab" typeface="Times New Roman"/>
         <a:font script="Hebr" typeface="Times New Roman"/>
@@ -4431,14 +5540,31 @@
         <a:font script="Viet" typeface="Times New Roman"/>
         <a:font script="Uigh" typeface="Microsoft Uighur"/>
         <a:font script="Geor" typeface="Sylfaen"/>
+        <a:font script="Armn" typeface="Arial"/>
+        <a:font script="Bugi" typeface="Leelawadee UI"/>
+        <a:font script="Bopo" typeface="Microsoft JhengHei"/>
+        <a:font script="Java" typeface="Javanese Text"/>
+        <a:font script="Lisu" typeface="Segoe UI"/>
+        <a:font script="Mymr" typeface="Myanmar Text"/>
+        <a:font script="Nkoo" typeface="Ebrima"/>
+        <a:font script="Olck" typeface="Nirmala UI"/>
+        <a:font script="Osma" typeface="Ebrima"/>
+        <a:font script="Phag" typeface="Phagspa"/>
+        <a:font script="Syrn" typeface="Estrangelo Edessa"/>
+        <a:font script="Syrj" typeface="Estrangelo Edessa"/>
+        <a:font script="Syre" typeface="Estrangelo Edessa"/>
+        <a:font script="Sora" typeface="Nirmala UI"/>
+        <a:font script="Tale" typeface="Microsoft Tai Le"/>
+        <a:font script="Talu" typeface="Microsoft New Tai Lue"/>
+        <a:font script="Tfng" typeface="Ebrima"/>
       </a:majorFont>
       <a:minorFont>
-        <a:latin typeface="Calibri"/>
+        <a:latin typeface="Aptos" panose="02110004020202020204"/>
         <a:ea typeface=""/>
         <a:cs typeface=""/>
-        <a:font script="Jpan" typeface="ＭＳ Ｐゴシック"/>
+        <a:font script="Jpan" typeface="游ゴシック"/>
         <a:font script="Hang" typeface="맑은 고딕"/>
-        <a:font script="Hans" typeface="宋体"/>
+        <a:font script="Hans" typeface="等线"/>
         <a:font script="Hant" typeface="新細明體"/>
         <a:font script="Arab" typeface="Arial"/>
         <a:font script="Hebr" typeface="Arial"/>
@@ -4466,6 +5592,23 @@
         <a:font script="Viet" typeface="Arial"/>
         <a:font script="Uigh" typeface="Microsoft Uighur"/>
         <a:font script="Geor" typeface="Sylfaen"/>
+        <a:font script="Armn" typeface="Arial"/>
+        <a:font script="Bugi" typeface="Leelawadee UI"/>
+        <a:font script="Bopo" typeface="Microsoft JhengHei"/>
+        <a:font script="Java" typeface="Javanese Text"/>
+        <a:font script="Lisu" typeface="Segoe UI"/>
+        <a:font script="Mymr" typeface="Myanmar Text"/>
+        <a:font script="Nkoo" typeface="Ebrima"/>
+        <a:font script="Olck" typeface="Nirmala UI"/>
+        <a:font script="Osma" typeface="Ebrima"/>
+        <a:font script="Phag" typeface="Phagspa"/>
+        <a:font script="Syrn" typeface="Estrangelo Edessa"/>
+        <a:font script="Syrj" typeface="Estrangelo Edessa"/>
+        <a:font script="Syre" typeface="Estrangelo Edessa"/>
+        <a:font script="Sora" typeface="Nirmala UI"/>
+        <a:font script="Tale" typeface="Microsoft Tai Le"/>
+        <a:font script="Talu" typeface="Microsoft New Tai Lue"/>
+        <a:font script="Tfng" typeface="Ebrima"/>
       </a:minorFont>
     </a:fontScheme>
     <a:fmtScheme name="Office">
@@ -4477,180 +5620,136 @@
           <a:gsLst>
             <a:gs pos="0">
               <a:schemeClr val="phClr">
-                <a:tint val="50000"/>
-                <a:satMod val="300000"/>
+                <a:lumMod val="110000"/>
+                <a:satMod val="105000"/>
+                <a:tint val="67000"/>
               </a:schemeClr>
             </a:gs>
-            <a:gs pos="35000">
+            <a:gs pos="50000">
               <a:schemeClr val="phClr">
-                <a:tint val="37000"/>
-                <a:satMod val="300000"/>
+                <a:lumMod val="105000"/>
+                <a:satMod val="103000"/>
+                <a:tint val="73000"/>
               </a:schemeClr>
             </a:gs>
             <a:gs pos="100000">
               <a:schemeClr val="phClr">
-                <a:tint val="15000"/>
-                <a:satMod val="350000"/>
+                <a:lumMod val="105000"/>
+                <a:satMod val="109000"/>
+                <a:tint val="81000"/>
               </a:schemeClr>
             </a:gs>
           </a:gsLst>
-          <a:lin ang="16200000" scaled="1"/>
+          <a:lin ang="5400000" scaled="0"/>
         </a:gradFill>
         <a:gradFill rotWithShape="1">
           <a:gsLst>
             <a:gs pos="0">
               <a:schemeClr val="phClr">
-                <a:tint val="100000"/>
+                <a:satMod val="103000"/>
+                <a:lumMod val="102000"/>
+                <a:tint val="94000"/>
+              </a:schemeClr>
+            </a:gs>
+            <a:gs pos="50000">
+              <a:schemeClr val="phClr">
+                <a:satMod val="110000"/>
+                <a:lumMod val="100000"/>
                 <a:shade val="100000"/>
-                <a:satMod val="130000"/>
               </a:schemeClr>
             </a:gs>
             <a:gs pos="100000">
               <a:schemeClr val="phClr">
-                <a:tint val="50000"/>
-                <a:shade val="100000"/>
-                <a:satMod val="350000"/>
+                <a:lumMod val="99000"/>
+                <a:satMod val="120000"/>
+                <a:shade val="78000"/>
               </a:schemeClr>
             </a:gs>
           </a:gsLst>
-          <a:lin ang="16200000" scaled="0"/>
+          <a:lin ang="5400000" scaled="0"/>
         </a:gradFill>
       </a:fillStyleLst>
       <a:lnStyleLst>
-        <a:ln w="9525" cap="flat" cmpd="sng" algn="ctr">
+        <a:ln w="12700" cap="flat" cmpd="sng" algn="ctr">
           <a:solidFill>
-            <a:schemeClr val="phClr">
-              <a:shade val="95000"/>
-              <a:satMod val="105000"/>
-            </a:schemeClr>
+            <a:schemeClr val="phClr"/>
           </a:solidFill>
           <a:prstDash val="solid"/>
+          <a:miter lim="800000"/>
+        </a:ln>
+        <a:ln w="19050" cap="flat" cmpd="sng" algn="ctr">
+          <a:solidFill>
+            <a:schemeClr val="phClr"/>
+          </a:solidFill>
+          <a:prstDash val="solid"/>
+          <a:miter lim="800000"/>
         </a:ln>
         <a:ln w="25400" cap="flat" cmpd="sng" algn="ctr">
           <a:solidFill>
             <a:schemeClr val="phClr"/>
           </a:solidFill>
           <a:prstDash val="solid"/>
-        </a:ln>
-        <a:ln w="38100" cap="flat" cmpd="sng" algn="ctr">
-          <a:solidFill>
-            <a:schemeClr val="phClr"/>
-          </a:solidFill>
-          <a:prstDash val="solid"/>
+          <a:miter lim="800000"/>
         </a:ln>
       </a:lnStyleLst>
       <a:effectStyleLst>
         <a:effectStyle>
+          <a:effectLst/>
+        </a:effectStyle>
+        <a:effectStyle>
+          <a:effectLst/>
+        </a:effectStyle>
+        <a:effectStyle>
           <a:effectLst>
-            <a:outerShdw blurRad="40000" dist="20000" dir="5400000" rotWithShape="0">
+            <a:outerShdw blurRad="57150" dist="19050" dir="5400000" algn="ctr" rotWithShape="0">
               <a:srgbClr val="000000">
-                <a:alpha val="38000"/>
+                <a:alpha val="63000"/>
               </a:srgbClr>
             </a:outerShdw>
           </a:effectLst>
-        </a:effectStyle>
-        <a:effectStyle>
-          <a:effectLst>
-            <a:outerShdw blurRad="40000" dist="23000" dir="5400000" rotWithShape="0">
-              <a:srgbClr val="000000">
-                <a:alpha val="35000"/>
-              </a:srgbClr>
-            </a:outerShdw>
-          </a:effectLst>
-        </a:effectStyle>
-        <a:effectStyle>
-          <a:effectLst>
-            <a:outerShdw blurRad="40000" dist="23000" dir="5400000" rotWithShape="0">
-              <a:srgbClr val="000000">
-                <a:alpha val="35000"/>
-              </a:srgbClr>
-            </a:outerShdw>
-          </a:effectLst>
-          <a:scene3d>
-            <a:camera prst="orthographicFront">
-              <a:rot lat="0" lon="0" rev="0"/>
-            </a:camera>
-            <a:lightRig rig="threePt" dir="t">
-              <a:rot lat="0" lon="0" rev="1200000"/>
-            </a:lightRig>
-          </a:scene3d>
-          <a:sp3d>
-            <a:bevelT w="63500" h="25400"/>
-          </a:sp3d>
         </a:effectStyle>
       </a:effectStyleLst>
       <a:bgFillStyleLst>
         <a:solidFill>
           <a:schemeClr val="phClr"/>
         </a:solidFill>
+        <a:solidFill>
+          <a:schemeClr val="phClr">
+            <a:tint val="95000"/>
+            <a:satMod val="170000"/>
+          </a:schemeClr>
+        </a:solidFill>
         <a:gradFill rotWithShape="1">
           <a:gsLst>
             <a:gs pos="0">
               <a:schemeClr val="phClr">
-                <a:tint val="40000"/>
-                <a:satMod val="350000"/>
+                <a:tint val="93000"/>
+                <a:satMod val="150000"/>
+                <a:shade val="98000"/>
+                <a:lumMod val="102000"/>
               </a:schemeClr>
             </a:gs>
-            <a:gs pos="40000">
+            <a:gs pos="50000">
               <a:schemeClr val="phClr">
-                <a:tint val="45000"/>
-                <a:shade val="99000"/>
-                <a:satMod val="350000"/>
+                <a:tint val="98000"/>
+                <a:satMod val="130000"/>
+                <a:shade val="90000"/>
+                <a:lumMod val="103000"/>
               </a:schemeClr>
             </a:gs>
             <a:gs pos="100000">
               <a:schemeClr val="phClr">
-                <a:shade val="20000"/>
-                <a:satMod val="255000"/>
+                <a:shade val="63000"/>
+                <a:satMod val="120000"/>
               </a:schemeClr>
             </a:gs>
           </a:gsLst>
-          <a:path path="circle">
-            <a:fillToRect l="50000" t="-80000" r="50000" b="180000"/>
-          </a:path>
-        </a:gradFill>
-        <a:gradFill rotWithShape="1">
-          <a:gsLst>
-            <a:gs pos="0">
-              <a:schemeClr val="phClr">
-                <a:tint val="80000"/>
-                <a:satMod val="300000"/>
-              </a:schemeClr>
-            </a:gs>
-            <a:gs pos="100000">
-              <a:schemeClr val="phClr">
-                <a:shade val="30000"/>
-                <a:satMod val="200000"/>
-              </a:schemeClr>
-            </a:gs>
-          </a:gsLst>
-          <a:path path="circle">
-            <a:fillToRect l="50000" t="50000" r="50000" b="50000"/>
-          </a:path>
+          <a:lin ang="5400000" scaled="0"/>
         </a:gradFill>
       </a:bgFillStyleLst>
     </a:fmtScheme>
   </a:themeElements>
   <a:objectDefaults>
-    <a:spDef>
-      <a:spPr/>
-      <a:bodyPr/>
-      <a:lstStyle/>
-      <a:style>
-        <a:lnRef idx="1">
-          <a:schemeClr val="accent1"/>
-        </a:lnRef>
-        <a:fillRef idx="3">
-          <a:schemeClr val="accent1"/>
-        </a:fillRef>
-        <a:effectRef idx="2">
-          <a:schemeClr val="accent1"/>
-        </a:effectRef>
-        <a:fontRef idx="minor">
-          <a:schemeClr val="lt1"/>
-        </a:fontRef>
-      </a:style>
-    </a:spDef>
     <a:lnDef>
       <a:spPr/>
       <a:bodyPr/>
@@ -4672,6 +5771,11 @@
     </a:lnDef>
   </a:objectDefaults>
   <a:extraClrSchemeLst/>
+  <a:extLst>
+    <a:ext uri="{05A4C25C-085E-4340-85A3-A5531E510DB2}">
+      <thm15:themeFamily xmlns:thm15="http://schemas.microsoft.com/office/thememl/2012/main" name="Office Theme" id="{2E142A2C-CD16-42D6-873A-C26D2A0506FA}" vid="{1BDDFF52-6CD6-40A5-AB3C-68EB2F1E4D0A}"/>
+    </a:ext>
+  </a:extLst>
 </a:theme>
 </file>
 

</xml_diff>